<commit_message>
misurati tempi di calcolo dei vari codici
</commit_message>
<xml_diff>
--- a/presentation_Julia.pptx
+++ b/presentation_Julia.pptx
@@ -205,7 +205,7 @@
           <a:p>
             <a:fld id="{9D55F566-AC48-4027-B617-B466DC3E3B5A}" type="datetimeFigureOut">
               <a:rPr lang="en-GB" smtClean="0"/>
-              <a:t>05/09/2025</a:t>
+              <a:t>06/09/2025</a:t>
             </a:fld>
             <a:endParaRPr lang="en-GB"/>
           </a:p>
@@ -473,6 +473,90 @@
 </p:notesMaster>
 </file>
 
+<file path=ppt/notesSlides/notesSlide1.xml><?xml version="1.0" encoding="utf-8"?>
+<p:notes xmlns:a="http://schemas.openxmlformats.org/drawingml/2006/main" xmlns:r="http://schemas.openxmlformats.org/officeDocument/2006/relationships" xmlns:p="http://schemas.openxmlformats.org/presentationml/2006/main">
+  <p:cSld>
+    <p:spTree>
+      <p:nvGrpSpPr>
+        <p:cNvPr id="1" name=""/>
+        <p:cNvGrpSpPr/>
+        <p:nvPr/>
+      </p:nvGrpSpPr>
+      <p:grpSpPr>
+        <a:xfrm>
+          <a:off x="0" y="0"/>
+          <a:ext cx="0" cy="0"/>
+          <a:chOff x="0" y="0"/>
+          <a:chExt cx="0" cy="0"/>
+        </a:xfrm>
+      </p:grpSpPr>
+      <p:sp>
+        <p:nvSpPr>
+          <p:cNvPr id="2" name="Slide Image Placeholder 1"/>
+          <p:cNvSpPr>
+            <a:spLocks noGrp="1" noRot="1" noChangeAspect="1"/>
+          </p:cNvSpPr>
+          <p:nvPr>
+            <p:ph type="sldImg"/>
+          </p:nvPr>
+        </p:nvSpPr>
+        <p:spPr/>
+      </p:sp>
+      <p:sp>
+        <p:nvSpPr>
+          <p:cNvPr id="3" name="Notes Placeholder 2"/>
+          <p:cNvSpPr>
+            <a:spLocks noGrp="1"/>
+          </p:cNvSpPr>
+          <p:nvPr>
+            <p:ph type="body" idx="1"/>
+          </p:nvPr>
+        </p:nvSpPr>
+        <p:spPr/>
+        <p:txBody>
+          <a:bodyPr/>
+          <a:lstStyle/>
+          <a:p>
+            <a:endParaRPr lang="en-US" dirty="0"/>
+          </a:p>
+        </p:txBody>
+      </p:sp>
+      <p:sp>
+        <p:nvSpPr>
+          <p:cNvPr id="4" name="Slide Number Placeholder 3"/>
+          <p:cNvSpPr>
+            <a:spLocks noGrp="1"/>
+          </p:cNvSpPr>
+          <p:nvPr>
+            <p:ph type="sldNum" sz="quarter" idx="5"/>
+          </p:nvPr>
+        </p:nvSpPr>
+        <p:spPr/>
+        <p:txBody>
+          <a:bodyPr/>
+          <a:lstStyle/>
+          <a:p>
+            <a:fld id="{84A9D7A9-AA27-4F7E-A90D-80880BEA1052}" type="slidenum">
+              <a:rPr lang="en-GB" smtClean="0"/>
+              <a:t>8</a:t>
+            </a:fld>
+            <a:endParaRPr lang="en-GB"/>
+          </a:p>
+        </p:txBody>
+      </p:sp>
+    </p:spTree>
+    <p:extLst>
+      <p:ext uri="{BB962C8B-B14F-4D97-AF65-F5344CB8AC3E}">
+        <p14:creationId xmlns:p14="http://schemas.microsoft.com/office/powerpoint/2010/main" val="4108864431"/>
+      </p:ext>
+    </p:extLst>
+  </p:cSld>
+  <p:clrMapOvr>
+    <a:masterClrMapping/>
+  </p:clrMapOvr>
+</p:notes>
+</file>
+
 <file path=ppt/slideLayouts/slideLayout1.xml><?xml version="1.0" encoding="utf-8"?>
 <p:sldLayout xmlns:a="http://schemas.openxmlformats.org/drawingml/2006/main" xmlns:r="http://schemas.openxmlformats.org/officeDocument/2006/relationships" xmlns:p="http://schemas.openxmlformats.org/presentationml/2006/main" type="title" preserve="1">
   <p:cSld name="Diapositiva titolo">
@@ -622,7 +706,7 @@
           <a:p>
             <a:fld id="{2A65074A-A7B6-4154-A47A-6F1D2E4E8C5D}" type="datetime1">
               <a:rPr lang="en-GB" smtClean="0"/>
-              <a:t>05/09/2025</a:t>
+              <a:t>06/09/2025</a:t>
             </a:fld>
             <a:endParaRPr lang="en-GB"/>
           </a:p>
@@ -822,7 +906,7 @@
           <a:p>
             <a:fld id="{7113394D-292B-4FF9-A2B9-7DED62EC482D}" type="datetime1">
               <a:rPr lang="en-GB" smtClean="0"/>
-              <a:t>05/09/2025</a:t>
+              <a:t>06/09/2025</a:t>
             </a:fld>
             <a:endParaRPr lang="en-GB"/>
           </a:p>
@@ -1032,7 +1116,7 @@
           <a:p>
             <a:fld id="{51E4AD21-E657-42F8-9700-23F273B28CC7}" type="datetime1">
               <a:rPr lang="en-GB" smtClean="0"/>
-              <a:t>05/09/2025</a:t>
+              <a:t>06/09/2025</a:t>
             </a:fld>
             <a:endParaRPr lang="en-GB"/>
           </a:p>
@@ -1232,7 +1316,7 @@
           <a:p>
             <a:fld id="{15F2551B-0F79-4489-8931-2BEC430FDA7D}" type="datetime1">
               <a:rPr lang="en-GB" smtClean="0"/>
-              <a:t>05/09/2025</a:t>
+              <a:t>06/09/2025</a:t>
             </a:fld>
             <a:endParaRPr lang="en-GB"/>
           </a:p>
@@ -1508,7 +1592,7 @@
           <a:p>
             <a:fld id="{340B7FAB-F407-4339-A360-E2911C2D51BE}" type="datetime1">
               <a:rPr lang="en-GB" smtClean="0"/>
-              <a:t>05/09/2025</a:t>
+              <a:t>06/09/2025</a:t>
             </a:fld>
             <a:endParaRPr lang="en-GB"/>
           </a:p>
@@ -1776,7 +1860,7 @@
           <a:p>
             <a:fld id="{5C43B96B-4E27-42C8-9BEA-FE8FDCBE9ABC}" type="datetime1">
               <a:rPr lang="en-GB" smtClean="0"/>
-              <a:t>05/09/2025</a:t>
+              <a:t>06/09/2025</a:t>
             </a:fld>
             <a:endParaRPr lang="en-GB"/>
           </a:p>
@@ -2191,7 +2275,7 @@
           <a:p>
             <a:fld id="{5F85AB22-A3E9-4F58-90A4-34BDD48B3985}" type="datetime1">
               <a:rPr lang="en-GB" smtClean="0"/>
-              <a:t>05/09/2025</a:t>
+              <a:t>06/09/2025</a:t>
             </a:fld>
             <a:endParaRPr lang="en-GB"/>
           </a:p>
@@ -2333,7 +2417,7 @@
           <a:p>
             <a:fld id="{B7A949E5-0C80-4016-8601-9B02B2D51198}" type="datetime1">
               <a:rPr lang="en-GB" smtClean="0"/>
-              <a:t>05/09/2025</a:t>
+              <a:t>06/09/2025</a:t>
             </a:fld>
             <a:endParaRPr lang="en-GB"/>
           </a:p>
@@ -2446,7 +2530,7 @@
           <a:p>
             <a:fld id="{492F142D-375B-420C-9B29-5AAA823C1ED2}" type="datetime1">
               <a:rPr lang="en-GB" smtClean="0"/>
-              <a:t>05/09/2025</a:t>
+              <a:t>06/09/2025</a:t>
             </a:fld>
             <a:endParaRPr lang="en-GB"/>
           </a:p>
@@ -2759,7 +2843,7 @@
           <a:p>
             <a:fld id="{141919DE-B32C-409A-B4DA-0CA07A83A73F}" type="datetime1">
               <a:rPr lang="en-GB" smtClean="0"/>
-              <a:t>05/09/2025</a:t>
+              <a:t>06/09/2025</a:t>
             </a:fld>
             <a:endParaRPr lang="en-GB"/>
           </a:p>
@@ -3048,7 +3132,7 @@
           <a:p>
             <a:fld id="{F263CC31-967E-4E59-8460-A7813C4F0283}" type="datetime1">
               <a:rPr lang="en-GB" smtClean="0"/>
-              <a:t>05/09/2025</a:t>
+              <a:t>06/09/2025</a:t>
             </a:fld>
             <a:endParaRPr lang="en-GB"/>
           </a:p>
@@ -3291,7 +3375,7 @@
           <a:p>
             <a:fld id="{DB8DB26D-6AA6-4764-97C2-9BE14F0E5FD8}" type="datetime1">
               <a:rPr lang="en-GB" smtClean="0"/>
-              <a:t>05/09/2025</a:t>
+              <a:t>06/09/2025</a:t>
             </a:fld>
             <a:endParaRPr lang="en-GB"/>
           </a:p>
@@ -5051,10 +5135,10 @@
           <a:lstStyle/>
           <a:p>
             <a:fld id="{619A0612-47CE-46C5-A28E-F10D87CAACAD}" type="slidenum">
-              <a:rPr lang="en-GB" smtClean="0"/>
+              <a:rPr lang="en-US" noProof="0" smtClean="0"/>
               <a:t>2</a:t>
             </a:fld>
-            <a:endParaRPr lang="en-GB"/>
+            <a:endParaRPr lang="en-US" noProof="0" dirty="0"/>
           </a:p>
         </p:txBody>
       </p:sp>
@@ -5249,13 +5333,8 @@
           <a:p>
             <a:r>
               <a:rPr lang="en-US" sz="3200" b="1" noProof="0" dirty="0"/>
-              <a:t>What </a:t>
-            </a:r>
-            <a:r>
-              <a:rPr lang="en-US" sz="3200" b="1" dirty="0"/>
-              <a:t>makes Julia, Julia?</a:t>
-            </a:r>
-            <a:endParaRPr lang="en-US" sz="3200" b="1" noProof="0" dirty="0"/>
+              <a:t>What makes Julia, Julia?</a:t>
+            </a:r>
           </a:p>
         </p:txBody>
       </p:sp>
@@ -5281,10 +5360,10 @@
           <a:lstStyle/>
           <a:p>
             <a:fld id="{619A0612-47CE-46C5-A28E-F10D87CAACAD}" type="slidenum">
-              <a:rPr lang="en-GB" smtClean="0"/>
+              <a:rPr lang="en-US" noProof="0" smtClean="0"/>
               <a:t>3</a:t>
             </a:fld>
-            <a:endParaRPr lang="en-GB"/>
+            <a:endParaRPr lang="en-US" noProof="0" dirty="0"/>
           </a:p>
         </p:txBody>
       </p:sp>
@@ -5550,10 +5629,9 @@
           <a:lstStyle/>
           <a:p>
             <a:r>
-              <a:rPr lang="en-US" sz="3200" b="1" dirty="0"/>
+              <a:rPr lang="en-US" sz="3200" b="1" noProof="0" dirty="0"/>
               <a:t>Advantages of Julia</a:t>
             </a:r>
-            <a:endParaRPr lang="en-US" sz="3200" b="1" noProof="0" dirty="0"/>
           </a:p>
         </p:txBody>
       </p:sp>
@@ -5579,10 +5657,10 @@
           <a:lstStyle/>
           <a:p>
             <a:fld id="{619A0612-47CE-46C5-A28E-F10D87CAACAD}" type="slidenum">
-              <a:rPr lang="en-GB" smtClean="0"/>
+              <a:rPr lang="en-US" noProof="0" smtClean="0"/>
               <a:t>4</a:t>
             </a:fld>
-            <a:endParaRPr lang="en-GB"/>
+            <a:endParaRPr lang="en-US" noProof="0" dirty="0"/>
           </a:p>
         </p:txBody>
       </p:sp>
@@ -5781,10 +5859,9 @@
           <a:lstStyle/>
           <a:p>
             <a:r>
-              <a:rPr lang="en-US" sz="3200" b="1" dirty="0"/>
+              <a:rPr lang="en-US" sz="3200" b="1" noProof="0" dirty="0"/>
               <a:t>The case study</a:t>
             </a:r>
-            <a:endParaRPr lang="en-US" sz="3200" b="1" noProof="0" dirty="0"/>
           </a:p>
         </p:txBody>
       </p:sp>
@@ -5810,10 +5887,10 @@
           <a:lstStyle/>
           <a:p>
             <a:fld id="{619A0612-47CE-46C5-A28E-F10D87CAACAD}" type="slidenum">
-              <a:rPr lang="en-GB" smtClean="0"/>
+              <a:rPr lang="en-US" noProof="0" smtClean="0"/>
               <a:t>5</a:t>
             </a:fld>
-            <a:endParaRPr lang="en-GB"/>
+            <a:endParaRPr lang="en-US" noProof="0" dirty="0"/>
           </a:p>
         </p:txBody>
       </p:sp>
@@ -5889,8 +5966,8 @@
           </a:prstGeom>
         </p:spPr>
       </p:pic>
-      <mc:AlternateContent xmlns:mc="http://schemas.openxmlformats.org/markup-compatibility/2006" xmlns:a14="http://schemas.microsoft.com/office/drawing/2010/main">
-        <mc:Choice Requires="a14">
+      <mc:AlternateContent xmlns:mc="http://schemas.openxmlformats.org/markup-compatibility/2006">
+        <mc:Choice xmlns:a14="http://schemas.microsoft.com/office/drawing/2010/main" Requires="a14">
           <p:sp>
             <p:nvSpPr>
               <p:cNvPr id="2" name="CasellaDiTesto 1">
@@ -5929,20 +6006,20 @@
                       <m:f>
                         <m:fPr>
                           <m:ctrlPr>
-                            <a:rPr lang="it-IT" b="0" i="1" smtClean="0">
+                            <a:rPr lang="en-US" b="0" i="1" noProof="0" smtClean="0">
                               <a:latin typeface="Cambria Math" panose="02040503050406030204" pitchFamily="18" charset="0"/>
                             </a:rPr>
                           </m:ctrlPr>
                         </m:fPr>
                         <m:num>
                           <m:r>
-                            <a:rPr lang="it-IT" b="0" i="1" smtClean="0">
+                            <a:rPr lang="en-US" b="0" i="1" noProof="0" smtClean="0">
                               <a:latin typeface="Cambria Math" panose="02040503050406030204" pitchFamily="18" charset="0"/>
                             </a:rPr>
                             <m:t>𝜕</m:t>
                           </m:r>
                           <m:r>
-                            <a:rPr lang="it-IT" b="0" i="1" smtClean="0">
+                            <a:rPr lang="en-US" b="0" i="1" noProof="0" smtClean="0">
                               <a:latin typeface="Cambria Math" panose="02040503050406030204" pitchFamily="18" charset="0"/>
                             </a:rPr>
                             <m:t>h</m:t>
@@ -5950,13 +6027,13 @@
                         </m:num>
                         <m:den>
                           <m:r>
-                            <a:rPr lang="it-IT" b="0" i="1" smtClean="0">
+                            <a:rPr lang="en-US" b="0" i="1" noProof="0" smtClean="0">
                               <a:latin typeface="Cambria Math" panose="02040503050406030204" pitchFamily="18" charset="0"/>
                             </a:rPr>
                             <m:t>𝜕</m:t>
                           </m:r>
                           <m:r>
-                            <a:rPr lang="it-IT" b="0" i="1" smtClean="0">
+                            <a:rPr lang="en-US" b="0" i="1" noProof="0" smtClean="0">
                               <a:latin typeface="Cambria Math" panose="02040503050406030204" pitchFamily="18" charset="0"/>
                             </a:rPr>
                             <m:t>𝑡</m:t>
@@ -5964,7 +6041,7 @@
                         </m:den>
                       </m:f>
                       <m:r>
-                        <a:rPr lang="it-IT" b="0" i="1" smtClean="0">
+                        <a:rPr lang="en-US" b="0" i="1" noProof="0" smtClean="0">
                           <a:latin typeface="Cambria Math" panose="02040503050406030204" pitchFamily="18" charset="0"/>
                         </a:rPr>
                         <m:t>+</m:t>
@@ -5972,32 +6049,32 @@
                       <m:f>
                         <m:fPr>
                           <m:ctrlPr>
-                            <a:rPr lang="it-IT" b="0" i="1" smtClean="0">
+                            <a:rPr lang="en-US" b="0" i="1" noProof="0" smtClean="0">
                               <a:latin typeface="Cambria Math" panose="02040503050406030204" pitchFamily="18" charset="0"/>
                             </a:rPr>
                           </m:ctrlPr>
                         </m:fPr>
                         <m:num>
                           <m:r>
-                            <a:rPr lang="it-IT" b="0" i="1" smtClean="0">
+                            <a:rPr lang="en-US" b="0" i="1" noProof="0" smtClean="0">
                               <a:latin typeface="Cambria Math" panose="02040503050406030204" pitchFamily="18" charset="0"/>
                             </a:rPr>
                             <m:t>𝜕</m:t>
                           </m:r>
                           <m:r>
-                            <a:rPr lang="it-IT" b="0" i="1" smtClean="0">
+                            <a:rPr lang="en-US" b="0" i="1" noProof="0" smtClean="0">
                               <a:latin typeface="Cambria Math" panose="02040503050406030204" pitchFamily="18" charset="0"/>
                             </a:rPr>
                             <m:t>(</m:t>
                           </m:r>
                           <m:r>
-                            <a:rPr lang="it-IT" b="0" i="1" smtClean="0">
+                            <a:rPr lang="en-US" b="0" i="1" noProof="0" smtClean="0">
                               <a:latin typeface="Cambria Math" panose="02040503050406030204" pitchFamily="18" charset="0"/>
                             </a:rPr>
                             <m:t>h𝑢</m:t>
                           </m:r>
                           <m:r>
-                            <a:rPr lang="it-IT" b="0" i="1" smtClean="0">
+                            <a:rPr lang="en-US" b="0" i="1" noProof="0" smtClean="0">
                               <a:latin typeface="Cambria Math" panose="02040503050406030204" pitchFamily="18" charset="0"/>
                             </a:rPr>
                             <m:t>)</m:t>
@@ -6005,13 +6082,13 @@
                         </m:num>
                         <m:den>
                           <m:r>
-                            <a:rPr lang="it-IT" b="0" i="1" smtClean="0">
+                            <a:rPr lang="en-US" b="0" i="1" noProof="0" smtClean="0">
                               <a:latin typeface="Cambria Math" panose="02040503050406030204" pitchFamily="18" charset="0"/>
                             </a:rPr>
                             <m:t>𝜕</m:t>
                           </m:r>
                           <m:r>
-                            <a:rPr lang="it-IT" b="0" i="1" smtClean="0">
+                            <a:rPr lang="en-US" b="0" i="1" noProof="0" smtClean="0">
                               <a:latin typeface="Cambria Math" panose="02040503050406030204" pitchFamily="18" charset="0"/>
                             </a:rPr>
                             <m:t>𝑥</m:t>
@@ -6019,7 +6096,7 @@
                         </m:den>
                       </m:f>
                       <m:r>
-                        <a:rPr lang="it-IT" b="0" i="1" smtClean="0">
+                        <a:rPr lang="en-US" b="0" i="1" noProof="0" smtClean="0">
                           <a:latin typeface="Cambria Math" panose="02040503050406030204" pitchFamily="18" charset="0"/>
                         </a:rPr>
                         <m:t>+</m:t>
@@ -6027,32 +6104,32 @@
                       <m:f>
                         <m:fPr>
                           <m:ctrlPr>
-                            <a:rPr lang="it-IT" b="0" i="1" smtClean="0">
+                            <a:rPr lang="en-US" b="0" i="1" noProof="0" smtClean="0">
                               <a:latin typeface="Cambria Math" panose="02040503050406030204" pitchFamily="18" charset="0"/>
                             </a:rPr>
                           </m:ctrlPr>
                         </m:fPr>
                         <m:num>
                           <m:r>
-                            <a:rPr lang="it-IT" b="0" i="1" smtClean="0">
+                            <a:rPr lang="en-US" b="0" i="1" noProof="0" smtClean="0">
                               <a:latin typeface="Cambria Math" panose="02040503050406030204" pitchFamily="18" charset="0"/>
                             </a:rPr>
                             <m:t>𝜕</m:t>
                           </m:r>
                           <m:r>
-                            <a:rPr lang="it-IT" b="0" i="1" smtClean="0">
+                            <a:rPr lang="en-US" b="0" i="1" noProof="0" smtClean="0">
                               <a:latin typeface="Cambria Math" panose="02040503050406030204" pitchFamily="18" charset="0"/>
                             </a:rPr>
                             <m:t>(</m:t>
                           </m:r>
                           <m:r>
-                            <a:rPr lang="it-IT" b="0" i="1" smtClean="0">
+                            <a:rPr lang="en-US" b="0" i="1" noProof="0" smtClean="0">
                               <a:latin typeface="Cambria Math" panose="02040503050406030204" pitchFamily="18" charset="0"/>
                             </a:rPr>
                             <m:t>h𝑣</m:t>
                           </m:r>
                           <m:r>
-                            <a:rPr lang="it-IT" b="0" i="1" smtClean="0">
+                            <a:rPr lang="en-US" b="0" i="1" noProof="0" smtClean="0">
                               <a:latin typeface="Cambria Math" panose="02040503050406030204" pitchFamily="18" charset="0"/>
                             </a:rPr>
                             <m:t>)</m:t>
@@ -6060,13 +6137,13 @@
                         </m:num>
                         <m:den>
                           <m:r>
-                            <a:rPr lang="it-IT" b="0" i="1" smtClean="0">
+                            <a:rPr lang="en-US" b="0" i="1" noProof="0" smtClean="0">
                               <a:latin typeface="Cambria Math" panose="02040503050406030204" pitchFamily="18" charset="0"/>
                             </a:rPr>
                             <m:t>𝜕</m:t>
                           </m:r>
                           <m:r>
-                            <a:rPr lang="it-IT" b="0" i="1" smtClean="0">
+                            <a:rPr lang="en-US" b="0" i="1" noProof="0" smtClean="0">
                               <a:latin typeface="Cambria Math" panose="02040503050406030204" pitchFamily="18" charset="0"/>
                             </a:rPr>
                             <m:t>𝑦</m:t>
@@ -6074,7 +6151,7 @@
                         </m:den>
                       </m:f>
                       <m:r>
-                        <a:rPr lang="it-IT" b="0" i="1" smtClean="0">
+                        <a:rPr lang="en-US" b="0" i="1" noProof="0" smtClean="0">
                           <a:latin typeface="Cambria Math" panose="02040503050406030204" pitchFamily="18" charset="0"/>
                         </a:rPr>
                         <m:t>=0</m:t>
@@ -6082,7 +6159,7 @@
                     </m:oMath>
                   </m:oMathPara>
                 </a14:m>
-                <a:endParaRPr lang="en-GB" dirty="0"/>
+                <a:endParaRPr lang="en-US" noProof="0" dirty="0"/>
               </a:p>
               <a:p>
                 <a:pPr/>
@@ -6095,14 +6172,14 @@
                       <m:f>
                         <m:fPr>
                           <m:ctrlPr>
-                            <a:rPr lang="it-IT" b="0" i="1" smtClean="0">
+                            <a:rPr lang="en-US" b="0" i="1" noProof="0" smtClean="0">
                               <a:latin typeface="Cambria Math" panose="02040503050406030204" pitchFamily="18" charset="0"/>
                             </a:rPr>
                           </m:ctrlPr>
                         </m:fPr>
                         <m:num>
                           <m:r>
-                            <a:rPr lang="it-IT" b="0" i="1" smtClean="0">
+                            <a:rPr lang="en-US" b="0" i="1" noProof="0" smtClean="0">
                               <a:latin typeface="Cambria Math" panose="02040503050406030204" pitchFamily="18" charset="0"/>
                             </a:rPr>
                             <m:t>𝜕</m:t>
@@ -6110,14 +6187,14 @@
                           <m:d>
                             <m:dPr>
                               <m:ctrlPr>
-                                <a:rPr lang="it-IT" b="0" i="1" smtClean="0">
+                                <a:rPr lang="en-US" b="0" i="1" noProof="0" smtClean="0">
                                   <a:latin typeface="Cambria Math" panose="02040503050406030204" pitchFamily="18" charset="0"/>
                                 </a:rPr>
                               </m:ctrlPr>
                             </m:dPr>
                             <m:e>
                               <m:r>
-                                <a:rPr lang="it-IT" b="0" i="1" smtClean="0">
+                                <a:rPr lang="en-US" b="0" i="1" noProof="0" smtClean="0">
                                   <a:latin typeface="Cambria Math" panose="02040503050406030204" pitchFamily="18" charset="0"/>
                                 </a:rPr>
                                 <m:t>h𝑢</m:t>
@@ -6127,13 +6204,13 @@
                         </m:num>
                         <m:den>
                           <m:r>
-                            <a:rPr lang="it-IT" b="0" i="1" smtClean="0">
+                            <a:rPr lang="en-US" b="0" i="1" noProof="0" smtClean="0">
                               <a:latin typeface="Cambria Math" panose="02040503050406030204" pitchFamily="18" charset="0"/>
                             </a:rPr>
                             <m:t>𝜕</m:t>
                           </m:r>
                           <m:r>
-                            <a:rPr lang="it-IT" b="0" i="1" smtClean="0">
+                            <a:rPr lang="en-US" b="0" i="1" noProof="0" smtClean="0">
                               <a:latin typeface="Cambria Math" panose="02040503050406030204" pitchFamily="18" charset="0"/>
                             </a:rPr>
                             <m:t>𝑡</m:t>
@@ -6141,7 +6218,7 @@
                         </m:den>
                       </m:f>
                       <m:r>
-                        <a:rPr lang="it-IT" b="0" i="1" smtClean="0">
+                        <a:rPr lang="en-US" b="0" i="1" noProof="0" smtClean="0">
                           <a:latin typeface="Cambria Math" panose="02040503050406030204" pitchFamily="18" charset="0"/>
                         </a:rPr>
                         <m:t>+</m:t>
@@ -6149,14 +6226,14 @@
                       <m:f>
                         <m:fPr>
                           <m:ctrlPr>
-                            <a:rPr lang="it-IT" b="0" i="1" smtClean="0">
+                            <a:rPr lang="en-US" b="0" i="1" noProof="0" smtClean="0">
                               <a:latin typeface="Cambria Math" panose="02040503050406030204" pitchFamily="18" charset="0"/>
                             </a:rPr>
                           </m:ctrlPr>
                         </m:fPr>
                         <m:num>
                           <m:r>
-                            <a:rPr lang="it-IT" b="0" i="1" smtClean="0">
+                            <a:rPr lang="en-US" b="0" i="1" noProof="0" smtClean="0">
                               <a:latin typeface="Cambria Math" panose="02040503050406030204" pitchFamily="18" charset="0"/>
                             </a:rPr>
                             <m:t>𝜕</m:t>
@@ -6164,13 +6241,13 @@
                         </m:num>
                         <m:den>
                           <m:r>
-                            <a:rPr lang="it-IT" b="0" i="1" smtClean="0">
+                            <a:rPr lang="en-US" b="0" i="1" noProof="0" smtClean="0">
                               <a:latin typeface="Cambria Math" panose="02040503050406030204" pitchFamily="18" charset="0"/>
                             </a:rPr>
                             <m:t>𝜕</m:t>
                           </m:r>
                           <m:r>
-                            <a:rPr lang="it-IT" b="0" i="1" smtClean="0">
+                            <a:rPr lang="en-US" b="0" i="1" noProof="0" smtClean="0">
                               <a:latin typeface="Cambria Math" panose="02040503050406030204" pitchFamily="18" charset="0"/>
                             </a:rPr>
                             <m:t>𝑥</m:t>
@@ -6180,7 +6257,7 @@
                       <m:d>
                         <m:dPr>
                           <m:ctrlPr>
-                            <a:rPr lang="it-IT" b="0" i="1" smtClean="0">
+                            <a:rPr lang="en-US" b="0" i="1" noProof="0" smtClean="0">
                               <a:latin typeface="Cambria Math" panose="02040503050406030204" pitchFamily="18" charset="0"/>
                             </a:rPr>
                           </m:ctrlPr>
@@ -6189,14 +6266,14 @@
                           <m:f>
                             <m:fPr>
                               <m:ctrlPr>
-                                <a:rPr lang="it-IT" b="0" i="1" smtClean="0">
+                                <a:rPr lang="en-US" b="0" i="1" noProof="0" smtClean="0">
                                   <a:latin typeface="Cambria Math" panose="02040503050406030204" pitchFamily="18" charset="0"/>
                                 </a:rPr>
                               </m:ctrlPr>
                             </m:fPr>
                             <m:num>
                               <m:r>
-                                <a:rPr lang="it-IT" b="0" i="1" smtClean="0">
+                                <a:rPr lang="en-US" b="0" i="1" noProof="0" smtClean="0">
                                   <a:latin typeface="Cambria Math" panose="02040503050406030204" pitchFamily="18" charset="0"/>
                                 </a:rPr>
                                 <m:t>1</m:t>
@@ -6204,7 +6281,7 @@
                             </m:num>
                             <m:den>
                               <m:r>
-                                <a:rPr lang="it-IT" b="0" i="1" smtClean="0">
+                                <a:rPr lang="en-US" b="0" i="1" noProof="0" smtClean="0">
                                   <a:latin typeface="Cambria Math" panose="02040503050406030204" pitchFamily="18" charset="0"/>
                                 </a:rPr>
                                 <m:t>2</m:t>
@@ -6212,7 +6289,7 @@
                             </m:den>
                           </m:f>
                           <m:r>
-                            <a:rPr lang="it-IT" b="0" i="1" smtClean="0">
+                            <a:rPr lang="en-US" b="0" i="1" noProof="0" smtClean="0">
                               <a:latin typeface="Cambria Math" panose="02040503050406030204" pitchFamily="18" charset="0"/>
                             </a:rPr>
                             <m:t>𝑔</m:t>
@@ -6220,14 +6297,14 @@
                           <m:sSup>
                             <m:sSupPr>
                               <m:ctrlPr>
-                                <a:rPr lang="it-IT" b="0" i="1" smtClean="0">
+                                <a:rPr lang="en-US" b="0" i="1" noProof="0" smtClean="0">
                                   <a:latin typeface="Cambria Math" panose="02040503050406030204" pitchFamily="18" charset="0"/>
                                 </a:rPr>
                               </m:ctrlPr>
                             </m:sSupPr>
                             <m:e>
                               <m:r>
-                                <a:rPr lang="it-IT" b="0" i="1" smtClean="0">
+                                <a:rPr lang="en-US" b="0" i="1" noProof="0" smtClean="0">
                                   <a:latin typeface="Cambria Math" panose="02040503050406030204" pitchFamily="18" charset="0"/>
                                 </a:rPr>
                                 <m:t>h</m:t>
@@ -6235,7 +6312,7 @@
                             </m:e>
                             <m:sup>
                               <m:r>
-                                <a:rPr lang="it-IT" b="0" i="1" smtClean="0">
+                                <a:rPr lang="en-US" b="0" i="1" noProof="0" smtClean="0">
                                   <a:latin typeface="Cambria Math" panose="02040503050406030204" pitchFamily="18" charset="0"/>
                                 </a:rPr>
                                 <m:t>2</m:t>
@@ -6243,13 +6320,13 @@
                             </m:sup>
                           </m:sSup>
                           <m:r>
-                            <a:rPr lang="it-IT" b="0" i="1" smtClean="0">
+                            <a:rPr lang="en-US" b="0" i="1" noProof="0" smtClean="0">
                               <a:latin typeface="Cambria Math" panose="02040503050406030204" pitchFamily="18" charset="0"/>
                             </a:rPr>
                             <m:t>+</m:t>
                           </m:r>
                           <m:r>
-                            <a:rPr lang="it-IT" b="0" i="1" smtClean="0">
+                            <a:rPr lang="en-US" b="0" i="1" noProof="0" smtClean="0">
                               <a:latin typeface="Cambria Math" panose="02040503050406030204" pitchFamily="18" charset="0"/>
                             </a:rPr>
                             <m:t>h</m:t>
@@ -6257,14 +6334,14 @@
                           <m:sSup>
                             <m:sSupPr>
                               <m:ctrlPr>
-                                <a:rPr lang="it-IT" b="0" i="1" smtClean="0">
+                                <a:rPr lang="en-US" b="0" i="1" noProof="0" smtClean="0">
                                   <a:latin typeface="Cambria Math" panose="02040503050406030204" pitchFamily="18" charset="0"/>
                                 </a:rPr>
                               </m:ctrlPr>
                             </m:sSupPr>
                             <m:e>
                               <m:r>
-                                <a:rPr lang="it-IT" b="0" i="1" smtClean="0">
+                                <a:rPr lang="en-US" b="0" i="1" noProof="0" smtClean="0">
                                   <a:latin typeface="Cambria Math" panose="02040503050406030204" pitchFamily="18" charset="0"/>
                                 </a:rPr>
                                 <m:t>𝑢</m:t>
@@ -6272,7 +6349,7 @@
                             </m:e>
                             <m:sup>
                               <m:r>
-                                <a:rPr lang="it-IT" b="0" i="1" smtClean="0">
+                                <a:rPr lang="en-US" b="0" i="1" noProof="0" smtClean="0">
                                   <a:latin typeface="Cambria Math" panose="02040503050406030204" pitchFamily="18" charset="0"/>
                                 </a:rPr>
                                 <m:t>2</m:t>
@@ -6282,7 +6359,7 @@
                         </m:e>
                       </m:d>
                       <m:r>
-                        <a:rPr lang="it-IT" b="0" i="1" smtClean="0">
+                        <a:rPr lang="en-US" b="0" i="1" noProof="0" smtClean="0">
                           <a:latin typeface="Cambria Math" panose="02040503050406030204" pitchFamily="18" charset="0"/>
                         </a:rPr>
                         <m:t>+</m:t>
@@ -6290,14 +6367,14 @@
                       <m:f>
                         <m:fPr>
                           <m:ctrlPr>
-                            <a:rPr lang="it-IT" b="0" i="1" smtClean="0">
+                            <a:rPr lang="en-US" b="0" i="1" noProof="0" smtClean="0">
                               <a:latin typeface="Cambria Math" panose="02040503050406030204" pitchFamily="18" charset="0"/>
                             </a:rPr>
                           </m:ctrlPr>
                         </m:fPr>
                         <m:num>
                           <m:r>
-                            <a:rPr lang="it-IT" b="0" i="1" smtClean="0">
+                            <a:rPr lang="en-US" b="0" i="1" noProof="0" smtClean="0">
                               <a:latin typeface="Cambria Math" panose="02040503050406030204" pitchFamily="18" charset="0"/>
                             </a:rPr>
                             <m:t>𝜕</m:t>
@@ -6305,14 +6382,14 @@
                           <m:d>
                             <m:dPr>
                               <m:ctrlPr>
-                                <a:rPr lang="it-IT" b="0" i="1" smtClean="0">
+                                <a:rPr lang="en-US" b="0" i="1" noProof="0" smtClean="0">
                                   <a:latin typeface="Cambria Math" panose="02040503050406030204" pitchFamily="18" charset="0"/>
                                 </a:rPr>
                               </m:ctrlPr>
                             </m:dPr>
                             <m:e>
                               <m:r>
-                                <a:rPr lang="it-IT" b="0" i="1" smtClean="0">
+                                <a:rPr lang="en-US" b="0" i="1" noProof="0" smtClean="0">
                                   <a:latin typeface="Cambria Math" panose="02040503050406030204" pitchFamily="18" charset="0"/>
                                 </a:rPr>
                                 <m:t>h𝑢𝑣</m:t>
@@ -6322,13 +6399,13 @@
                         </m:num>
                         <m:den>
                           <m:r>
-                            <a:rPr lang="it-IT" b="0" i="1" smtClean="0">
+                            <a:rPr lang="en-US" b="0" i="1" noProof="0" smtClean="0">
                               <a:latin typeface="Cambria Math" panose="02040503050406030204" pitchFamily="18" charset="0"/>
                             </a:rPr>
                             <m:t>𝜕</m:t>
                           </m:r>
                           <m:r>
-                            <a:rPr lang="it-IT" b="0" i="1" smtClean="0">
+                            <a:rPr lang="en-US" b="0" i="1" noProof="0" smtClean="0">
                               <a:latin typeface="Cambria Math" panose="02040503050406030204" pitchFamily="18" charset="0"/>
                             </a:rPr>
                             <m:t>𝑦</m:t>
@@ -6336,13 +6413,13 @@
                         </m:den>
                       </m:f>
                       <m:r>
-                        <a:rPr lang="it-IT" b="0" i="1" smtClean="0">
+                        <a:rPr lang="en-US" b="0" i="1" noProof="0" smtClean="0">
                           <a:latin typeface="Cambria Math" panose="02040503050406030204" pitchFamily="18" charset="0"/>
                         </a:rPr>
                         <m:t>+</m:t>
                       </m:r>
                       <m:r>
-                        <a:rPr lang="it-IT" b="0" i="1" smtClean="0">
+                        <a:rPr lang="en-US" b="0" i="1" noProof="0" smtClean="0">
                           <a:latin typeface="Cambria Math" panose="02040503050406030204" pitchFamily="18" charset="0"/>
                         </a:rPr>
                         <m:t>𝑔h</m:t>
@@ -6350,20 +6427,20 @@
                       <m:f>
                         <m:fPr>
                           <m:ctrlPr>
-                            <a:rPr lang="it-IT" b="0" i="1" smtClean="0">
+                            <a:rPr lang="en-US" b="0" i="1" noProof="0" smtClean="0">
                               <a:latin typeface="Cambria Math" panose="02040503050406030204" pitchFamily="18" charset="0"/>
                             </a:rPr>
                           </m:ctrlPr>
                         </m:fPr>
                         <m:num>
                           <m:r>
-                            <a:rPr lang="it-IT" b="0" i="1" smtClean="0">
+                            <a:rPr lang="en-US" b="0" i="1" noProof="0" smtClean="0">
                               <a:latin typeface="Cambria Math" panose="02040503050406030204" pitchFamily="18" charset="0"/>
                             </a:rPr>
                             <m:t>𝜕</m:t>
                           </m:r>
                           <m:r>
-                            <a:rPr lang="it-IT" b="0" i="1" smtClean="0">
+                            <a:rPr lang="en-US" b="0" i="1" noProof="0" smtClean="0">
                               <a:latin typeface="Cambria Math" panose="02040503050406030204" pitchFamily="18" charset="0"/>
                             </a:rPr>
                             <m:t>𝑏</m:t>
@@ -6371,13 +6448,13 @@
                         </m:num>
                         <m:den>
                           <m:r>
-                            <a:rPr lang="it-IT" b="0" i="1" smtClean="0">
+                            <a:rPr lang="en-US" b="0" i="1" noProof="0" smtClean="0">
                               <a:latin typeface="Cambria Math" panose="02040503050406030204" pitchFamily="18" charset="0"/>
                             </a:rPr>
                             <m:t>𝜕</m:t>
                           </m:r>
                           <m:r>
-                            <a:rPr lang="it-IT" b="0" i="1" smtClean="0">
+                            <a:rPr lang="en-US" b="0" i="1" noProof="0" smtClean="0">
                               <a:latin typeface="Cambria Math" panose="02040503050406030204" pitchFamily="18" charset="0"/>
                             </a:rPr>
                             <m:t>𝑥</m:t>
@@ -6385,7 +6462,7 @@
                         </m:den>
                       </m:f>
                       <m:r>
-                        <a:rPr lang="it-IT" b="0" i="1" smtClean="0">
+                        <a:rPr lang="en-US" b="0" i="1" noProof="0" smtClean="0">
                           <a:latin typeface="Cambria Math" panose="02040503050406030204" pitchFamily="18" charset="0"/>
                         </a:rPr>
                         <m:t>=0</m:t>
@@ -6393,7 +6470,7 @@
                     </m:oMath>
                   </m:oMathPara>
                 </a14:m>
-                <a:endParaRPr lang="it-IT" b="0" dirty="0"/>
+                <a:endParaRPr lang="en-US" b="0" noProof="0" dirty="0"/>
               </a:p>
               <a:p>
                 <a:pPr/>
@@ -6406,14 +6483,14 @@
                       <m:f>
                         <m:fPr>
                           <m:ctrlPr>
-                            <a:rPr lang="it-IT" b="0" i="1" smtClean="0">
+                            <a:rPr lang="en-US" b="0" i="1" noProof="0" smtClean="0">
                               <a:latin typeface="Cambria Math" panose="02040503050406030204" pitchFamily="18" charset="0"/>
                             </a:rPr>
                           </m:ctrlPr>
                         </m:fPr>
                         <m:num>
                           <m:r>
-                            <a:rPr lang="it-IT" b="0" i="1" smtClean="0">
+                            <a:rPr lang="en-US" b="0" i="1" noProof="0" smtClean="0">
                               <a:latin typeface="Cambria Math" panose="02040503050406030204" pitchFamily="18" charset="0"/>
                             </a:rPr>
                             <m:t>𝜕</m:t>
@@ -6421,14 +6498,14 @@
                           <m:d>
                             <m:dPr>
                               <m:ctrlPr>
-                                <a:rPr lang="it-IT" b="0" i="1" smtClean="0">
+                                <a:rPr lang="en-US" b="0" i="1" noProof="0" smtClean="0">
                                   <a:latin typeface="Cambria Math" panose="02040503050406030204" pitchFamily="18" charset="0"/>
                                 </a:rPr>
                               </m:ctrlPr>
                             </m:dPr>
                             <m:e>
                               <m:r>
-                                <a:rPr lang="it-IT" b="0" i="1" smtClean="0">
+                                <a:rPr lang="en-US" b="0" i="1" noProof="0" smtClean="0">
                                   <a:latin typeface="Cambria Math" panose="02040503050406030204" pitchFamily="18" charset="0"/>
                                 </a:rPr>
                                 <m:t>h𝑣</m:t>
@@ -6438,13 +6515,13 @@
                         </m:num>
                         <m:den>
                           <m:r>
-                            <a:rPr lang="it-IT" b="0" i="1" smtClean="0">
+                            <a:rPr lang="en-US" b="0" i="1" noProof="0" smtClean="0">
                               <a:latin typeface="Cambria Math" panose="02040503050406030204" pitchFamily="18" charset="0"/>
                             </a:rPr>
                             <m:t>𝜕</m:t>
                           </m:r>
                           <m:r>
-                            <a:rPr lang="it-IT" b="0" i="1" smtClean="0">
+                            <a:rPr lang="en-US" b="0" i="1" noProof="0" smtClean="0">
                               <a:latin typeface="Cambria Math" panose="02040503050406030204" pitchFamily="18" charset="0"/>
                             </a:rPr>
                             <m:t>𝑡</m:t>
@@ -6452,7 +6529,7 @@
                         </m:den>
                       </m:f>
                       <m:r>
-                        <a:rPr lang="it-IT" b="0" i="1" smtClean="0">
+                        <a:rPr lang="en-US" b="0" i="1" noProof="0" smtClean="0">
                           <a:latin typeface="Cambria Math" panose="02040503050406030204" pitchFamily="18" charset="0"/>
                         </a:rPr>
                         <m:t>+</m:t>
@@ -6460,14 +6537,14 @@
                       <m:f>
                         <m:fPr>
                           <m:ctrlPr>
-                            <a:rPr lang="it-IT" b="0" i="1" smtClean="0">
+                            <a:rPr lang="en-US" b="0" i="1" noProof="0" smtClean="0">
                               <a:latin typeface="Cambria Math" panose="02040503050406030204" pitchFamily="18" charset="0"/>
                             </a:rPr>
                           </m:ctrlPr>
                         </m:fPr>
                         <m:num>
                           <m:r>
-                            <a:rPr lang="it-IT" b="0" i="1" smtClean="0">
+                            <a:rPr lang="en-US" b="0" i="1" noProof="0" smtClean="0">
                               <a:latin typeface="Cambria Math" panose="02040503050406030204" pitchFamily="18" charset="0"/>
                             </a:rPr>
                             <m:t>𝜕</m:t>
@@ -6475,14 +6552,14 @@
                           <m:d>
                             <m:dPr>
                               <m:ctrlPr>
-                                <a:rPr lang="it-IT" b="0" i="1" smtClean="0">
+                                <a:rPr lang="en-US" b="0" i="1" noProof="0" smtClean="0">
                                   <a:latin typeface="Cambria Math" panose="02040503050406030204" pitchFamily="18" charset="0"/>
                                 </a:rPr>
                               </m:ctrlPr>
                             </m:dPr>
                             <m:e>
                               <m:r>
-                                <a:rPr lang="it-IT" b="0" i="1" smtClean="0">
+                                <a:rPr lang="en-US" b="0" i="1" noProof="0" smtClean="0">
                                   <a:latin typeface="Cambria Math" panose="02040503050406030204" pitchFamily="18" charset="0"/>
                                 </a:rPr>
                                 <m:t>h𝑢𝑣</m:t>
@@ -6492,13 +6569,13 @@
                         </m:num>
                         <m:den>
                           <m:r>
-                            <a:rPr lang="it-IT" b="0" i="1" smtClean="0">
+                            <a:rPr lang="en-US" b="0" i="1" noProof="0" smtClean="0">
                               <a:latin typeface="Cambria Math" panose="02040503050406030204" pitchFamily="18" charset="0"/>
                             </a:rPr>
                             <m:t>𝜕</m:t>
                           </m:r>
                           <m:r>
-                            <a:rPr lang="it-IT" b="0" i="1" smtClean="0">
+                            <a:rPr lang="en-US" b="0" i="1" noProof="0" smtClean="0">
                               <a:latin typeface="Cambria Math" panose="02040503050406030204" pitchFamily="18" charset="0"/>
                             </a:rPr>
                             <m:t>𝑥</m:t>
@@ -6506,7 +6583,7 @@
                         </m:den>
                       </m:f>
                       <m:r>
-                        <a:rPr lang="it-IT" b="0" i="1" smtClean="0">
+                        <a:rPr lang="en-US" b="0" i="1" noProof="0" smtClean="0">
                           <a:latin typeface="Cambria Math" panose="02040503050406030204" pitchFamily="18" charset="0"/>
                         </a:rPr>
                         <m:t>+</m:t>
@@ -6514,14 +6591,14 @@
                       <m:f>
                         <m:fPr>
                           <m:ctrlPr>
-                            <a:rPr lang="it-IT" b="0" i="1" smtClean="0">
+                            <a:rPr lang="en-US" b="0" i="1" noProof="0" smtClean="0">
                               <a:latin typeface="Cambria Math" panose="02040503050406030204" pitchFamily="18" charset="0"/>
                             </a:rPr>
                           </m:ctrlPr>
                         </m:fPr>
                         <m:num>
                           <m:r>
-                            <a:rPr lang="it-IT" b="0" i="1" smtClean="0">
+                            <a:rPr lang="en-US" b="0" i="1" noProof="0" smtClean="0">
                               <a:latin typeface="Cambria Math" panose="02040503050406030204" pitchFamily="18" charset="0"/>
                             </a:rPr>
                             <m:t>𝜕</m:t>
@@ -6529,13 +6606,13 @@
                         </m:num>
                         <m:den>
                           <m:r>
-                            <a:rPr lang="it-IT" b="0" i="1" smtClean="0">
+                            <a:rPr lang="en-US" b="0" i="1" noProof="0" smtClean="0">
                               <a:latin typeface="Cambria Math" panose="02040503050406030204" pitchFamily="18" charset="0"/>
                             </a:rPr>
                             <m:t>𝜕</m:t>
                           </m:r>
                           <m:r>
-                            <a:rPr lang="it-IT" b="0" i="1" smtClean="0">
+                            <a:rPr lang="en-US" b="0" i="1" noProof="0" smtClean="0">
                               <a:latin typeface="Cambria Math" panose="02040503050406030204" pitchFamily="18" charset="0"/>
                             </a:rPr>
                             <m:t>𝑦</m:t>
@@ -6545,7 +6622,7 @@
                       <m:d>
                         <m:dPr>
                           <m:ctrlPr>
-                            <a:rPr lang="it-IT" b="0" i="1" smtClean="0">
+                            <a:rPr lang="en-US" b="0" i="1" noProof="0" smtClean="0">
                               <a:latin typeface="Cambria Math" panose="02040503050406030204" pitchFamily="18" charset="0"/>
                             </a:rPr>
                           </m:ctrlPr>
@@ -6554,14 +6631,14 @@
                           <m:f>
                             <m:fPr>
                               <m:ctrlPr>
-                                <a:rPr lang="it-IT" b="0" i="1" smtClean="0">
+                                <a:rPr lang="en-US" b="0" i="1" noProof="0" smtClean="0">
                                   <a:latin typeface="Cambria Math" panose="02040503050406030204" pitchFamily="18" charset="0"/>
                                 </a:rPr>
                               </m:ctrlPr>
                             </m:fPr>
                             <m:num>
                               <m:r>
-                                <a:rPr lang="it-IT" b="0" i="1" smtClean="0">
+                                <a:rPr lang="en-US" b="0" i="1" noProof="0" smtClean="0">
                                   <a:latin typeface="Cambria Math" panose="02040503050406030204" pitchFamily="18" charset="0"/>
                                 </a:rPr>
                                 <m:t>1</m:t>
@@ -6569,7 +6646,7 @@
                             </m:num>
                             <m:den>
                               <m:r>
-                                <a:rPr lang="it-IT" b="0" i="1" smtClean="0">
+                                <a:rPr lang="en-US" b="0" i="1" noProof="0" smtClean="0">
                                   <a:latin typeface="Cambria Math" panose="02040503050406030204" pitchFamily="18" charset="0"/>
                                 </a:rPr>
                                 <m:t>2</m:t>
@@ -6577,7 +6654,7 @@
                             </m:den>
                           </m:f>
                           <m:r>
-                            <a:rPr lang="it-IT" b="0" i="1" smtClean="0">
+                            <a:rPr lang="en-US" b="0" i="1" noProof="0" smtClean="0">
                               <a:latin typeface="Cambria Math" panose="02040503050406030204" pitchFamily="18" charset="0"/>
                             </a:rPr>
                             <m:t>𝑔</m:t>
@@ -6585,14 +6662,14 @@
                           <m:sSup>
                             <m:sSupPr>
                               <m:ctrlPr>
-                                <a:rPr lang="it-IT" b="0" i="1" smtClean="0">
+                                <a:rPr lang="en-US" b="0" i="1" noProof="0" smtClean="0">
                                   <a:latin typeface="Cambria Math" panose="02040503050406030204" pitchFamily="18" charset="0"/>
                                 </a:rPr>
                               </m:ctrlPr>
                             </m:sSupPr>
                             <m:e>
                               <m:r>
-                                <a:rPr lang="it-IT" b="0" i="1" smtClean="0">
+                                <a:rPr lang="en-US" b="0" i="1" noProof="0" smtClean="0">
                                   <a:latin typeface="Cambria Math" panose="02040503050406030204" pitchFamily="18" charset="0"/>
                                 </a:rPr>
                                 <m:t>h</m:t>
@@ -6600,7 +6677,7 @@
                             </m:e>
                             <m:sup>
                               <m:r>
-                                <a:rPr lang="it-IT" b="0" i="1" smtClean="0">
+                                <a:rPr lang="en-US" b="0" i="1" noProof="0" smtClean="0">
                                   <a:latin typeface="Cambria Math" panose="02040503050406030204" pitchFamily="18" charset="0"/>
                                 </a:rPr>
                                 <m:t>2</m:t>
@@ -6608,13 +6685,13 @@
                             </m:sup>
                           </m:sSup>
                           <m:r>
-                            <a:rPr lang="it-IT" b="0" i="1" smtClean="0">
+                            <a:rPr lang="en-US" b="0" i="1" noProof="0" smtClean="0">
                               <a:latin typeface="Cambria Math" panose="02040503050406030204" pitchFamily="18" charset="0"/>
                             </a:rPr>
                             <m:t>+</m:t>
                           </m:r>
                           <m:r>
-                            <a:rPr lang="it-IT" b="0" i="1" smtClean="0">
+                            <a:rPr lang="en-US" b="0" i="1" noProof="0" smtClean="0">
                               <a:latin typeface="Cambria Math" panose="02040503050406030204" pitchFamily="18" charset="0"/>
                             </a:rPr>
                             <m:t>h</m:t>
@@ -6622,14 +6699,14 @@
                           <m:sSup>
                             <m:sSupPr>
                               <m:ctrlPr>
-                                <a:rPr lang="it-IT" b="0" i="1" smtClean="0">
+                                <a:rPr lang="en-US" b="0" i="1" noProof="0" smtClean="0">
                                   <a:latin typeface="Cambria Math" panose="02040503050406030204" pitchFamily="18" charset="0"/>
                                 </a:rPr>
                               </m:ctrlPr>
                             </m:sSupPr>
                             <m:e>
                               <m:r>
-                                <a:rPr lang="it-IT" b="0" i="1" smtClean="0">
+                                <a:rPr lang="en-US" b="0" i="1" noProof="0" smtClean="0">
                                   <a:latin typeface="Cambria Math" panose="02040503050406030204" pitchFamily="18" charset="0"/>
                                 </a:rPr>
                                 <m:t>𝑣</m:t>
@@ -6637,7 +6714,7 @@
                             </m:e>
                             <m:sup>
                               <m:r>
-                                <a:rPr lang="it-IT" b="0" i="1" smtClean="0">
+                                <a:rPr lang="en-US" b="0" i="1" noProof="0" smtClean="0">
                                   <a:latin typeface="Cambria Math" panose="02040503050406030204" pitchFamily="18" charset="0"/>
                                 </a:rPr>
                                 <m:t>2</m:t>
@@ -6647,13 +6724,13 @@
                         </m:e>
                       </m:d>
                       <m:r>
-                        <a:rPr lang="it-IT" b="0" i="1" smtClean="0">
+                        <a:rPr lang="en-US" b="0" i="1" noProof="0" smtClean="0">
                           <a:latin typeface="Cambria Math" panose="02040503050406030204" pitchFamily="18" charset="0"/>
                         </a:rPr>
                         <m:t>+</m:t>
                       </m:r>
                       <m:r>
-                        <a:rPr lang="it-IT" b="0" i="1" smtClean="0">
+                        <a:rPr lang="en-US" b="0" i="1" noProof="0" smtClean="0">
                           <a:latin typeface="Cambria Math" panose="02040503050406030204" pitchFamily="18" charset="0"/>
                         </a:rPr>
                         <m:t>𝑔h</m:t>
@@ -6661,20 +6738,20 @@
                       <m:f>
                         <m:fPr>
                           <m:ctrlPr>
-                            <a:rPr lang="it-IT" b="0" i="1" smtClean="0">
+                            <a:rPr lang="en-US" b="0" i="1" noProof="0" smtClean="0">
                               <a:latin typeface="Cambria Math" panose="02040503050406030204" pitchFamily="18" charset="0"/>
                             </a:rPr>
                           </m:ctrlPr>
                         </m:fPr>
                         <m:num>
                           <m:r>
-                            <a:rPr lang="it-IT" b="0" i="1" smtClean="0">
+                            <a:rPr lang="en-US" b="0" i="1" noProof="0" smtClean="0">
                               <a:latin typeface="Cambria Math" panose="02040503050406030204" pitchFamily="18" charset="0"/>
                             </a:rPr>
                             <m:t>𝜕</m:t>
                           </m:r>
                           <m:r>
-                            <a:rPr lang="it-IT" b="0" i="1" smtClean="0">
+                            <a:rPr lang="en-US" b="0" i="1" noProof="0" smtClean="0">
                               <a:latin typeface="Cambria Math" panose="02040503050406030204" pitchFamily="18" charset="0"/>
                             </a:rPr>
                             <m:t>𝑏</m:t>
@@ -6682,13 +6759,13 @@
                         </m:num>
                         <m:den>
                           <m:r>
-                            <a:rPr lang="it-IT" b="0" i="1" smtClean="0">
+                            <a:rPr lang="en-US" b="0" i="1" noProof="0" smtClean="0">
                               <a:latin typeface="Cambria Math" panose="02040503050406030204" pitchFamily="18" charset="0"/>
                             </a:rPr>
                             <m:t>𝜕</m:t>
                           </m:r>
                           <m:r>
-                            <a:rPr lang="it-IT" b="0" i="1" smtClean="0">
+                            <a:rPr lang="en-US" b="0" i="1" noProof="0" smtClean="0">
                               <a:latin typeface="Cambria Math" panose="02040503050406030204" pitchFamily="18" charset="0"/>
                             </a:rPr>
                             <m:t>𝑦</m:t>
@@ -6696,7 +6773,7 @@
                         </m:den>
                       </m:f>
                       <m:r>
-                        <a:rPr lang="it-IT" b="0" i="1" smtClean="0">
+                        <a:rPr lang="en-US" b="0" i="1" noProof="0" smtClean="0">
                           <a:latin typeface="Cambria Math" panose="02040503050406030204" pitchFamily="18" charset="0"/>
                         </a:rPr>
                         <m:t>=0</m:t>
@@ -6704,15 +6781,15 @@
                     </m:oMath>
                   </m:oMathPara>
                 </a14:m>
-                <a:endParaRPr lang="en-GB" dirty="0"/>
+                <a:endParaRPr lang="en-US" noProof="0" dirty="0"/>
               </a:p>
               <a:p>
-                <a:endParaRPr lang="en-GB" dirty="0"/>
+                <a:endParaRPr lang="en-US" noProof="0" dirty="0"/>
               </a:p>
             </p:txBody>
           </p:sp>
         </mc:Choice>
-        <mc:Fallback xmlns="">
+        <mc:Fallback>
           <p:sp>
             <p:nvSpPr>
               <p:cNvPr id="2" name="CasellaDiTesto 1">
@@ -6747,7 +6824,7 @@
               <a:lstStyle/>
               <a:p>
                 <a:r>
-                  <a:rPr lang="en-GB">
+                  <a:rPr lang="en-US">
                     <a:noFill/>
                   </a:rPr>
                   <a:t> </a:t>
@@ -6757,8 +6834,8 @@
           </p:sp>
         </mc:Fallback>
       </mc:AlternateContent>
-      <mc:AlternateContent xmlns:mc="http://schemas.openxmlformats.org/markup-compatibility/2006" xmlns:a14="http://schemas.microsoft.com/office/drawing/2010/main">
-        <mc:Choice Requires="a14">
+      <mc:AlternateContent xmlns:mc="http://schemas.openxmlformats.org/markup-compatibility/2006">
+        <mc:Choice xmlns:a14="http://schemas.microsoft.com/office/drawing/2010/main" Requires="a14">
           <p:sp>
             <p:nvSpPr>
               <p:cNvPr id="3" name="CasellaDiTesto 2">
@@ -6797,14 +6874,14 @@
                       <m:sSubSup>
                         <m:sSubSupPr>
                           <m:ctrlPr>
-                            <a:rPr lang="it-IT" b="0" i="1" smtClean="0">
+                            <a:rPr lang="en-US" b="0" i="1" noProof="0" smtClean="0">
                               <a:latin typeface="Cambria Math" panose="02040503050406030204" pitchFamily="18" charset="0"/>
                             </a:rPr>
                           </m:ctrlPr>
                         </m:sSubSupPr>
                         <m:e>
                           <m:r>
-                            <a:rPr lang="it-IT" b="0" i="1" smtClean="0">
+                            <a:rPr lang="en-US" b="0" i="1" noProof="0" smtClean="0">
                               <a:latin typeface="Cambria Math" panose="02040503050406030204" pitchFamily="18" charset="0"/>
                             </a:rPr>
                             <m:t>𝑄</m:t>
@@ -6812,19 +6889,19 @@
                         </m:e>
                         <m:sub>
                           <m:r>
-                            <a:rPr lang="it-IT" b="0" i="1" smtClean="0">
+                            <a:rPr lang="en-US" b="0" i="1" noProof="0" smtClean="0">
                               <a:latin typeface="Cambria Math" panose="02040503050406030204" pitchFamily="18" charset="0"/>
                             </a:rPr>
                             <m:t>𝑖</m:t>
                           </m:r>
                           <m:r>
-                            <a:rPr lang="it-IT" b="0" i="1" smtClean="0">
+                            <a:rPr lang="en-US" b="0" i="1" noProof="0" smtClean="0">
                               <a:latin typeface="Cambria Math" panose="02040503050406030204" pitchFamily="18" charset="0"/>
                             </a:rPr>
                             <m:t>,</m:t>
                           </m:r>
                           <m:r>
-                            <a:rPr lang="it-IT" b="0" i="1" smtClean="0">
+                            <a:rPr lang="en-US" b="0" i="1" noProof="0" smtClean="0">
                               <a:latin typeface="Cambria Math" panose="02040503050406030204" pitchFamily="18" charset="0"/>
                             </a:rPr>
                             <m:t>𝑗</m:t>
@@ -6832,13 +6909,13 @@
                         </m:sub>
                         <m:sup>
                           <m:r>
-                            <a:rPr lang="it-IT" b="0" i="1" smtClean="0">
+                            <a:rPr lang="en-US" b="0" i="1" noProof="0" smtClean="0">
                               <a:latin typeface="Cambria Math" panose="02040503050406030204" pitchFamily="18" charset="0"/>
                             </a:rPr>
                             <m:t>𝑛</m:t>
                           </m:r>
                           <m:r>
-                            <a:rPr lang="it-IT" b="0" i="1" smtClean="0">
+                            <a:rPr lang="en-US" b="0" i="1" noProof="0" smtClean="0">
                               <a:latin typeface="Cambria Math" panose="02040503050406030204" pitchFamily="18" charset="0"/>
                             </a:rPr>
                             <m:t>+1</m:t>
@@ -6846,7 +6923,7 @@
                         </m:sup>
                       </m:sSubSup>
                       <m:r>
-                        <a:rPr lang="it-IT" b="0" i="1" smtClean="0">
+                        <a:rPr lang="en-US" b="0" i="1" noProof="0" smtClean="0">
                           <a:latin typeface="Cambria Math" panose="02040503050406030204" pitchFamily="18" charset="0"/>
                         </a:rPr>
                         <m:t>=</m:t>
@@ -6854,14 +6931,14 @@
                       <m:sSubSup>
                         <m:sSubSupPr>
                           <m:ctrlPr>
-                            <a:rPr lang="it-IT" b="0" i="1" smtClean="0">
+                            <a:rPr lang="en-US" b="0" i="1" noProof="0" smtClean="0">
                               <a:latin typeface="Cambria Math" panose="02040503050406030204" pitchFamily="18" charset="0"/>
                             </a:rPr>
                           </m:ctrlPr>
                         </m:sSubSupPr>
                         <m:e>
                           <m:r>
-                            <a:rPr lang="it-IT" b="0" i="1" smtClean="0">
+                            <a:rPr lang="en-US" b="0" i="1" noProof="0" smtClean="0">
                               <a:latin typeface="Cambria Math" panose="02040503050406030204" pitchFamily="18" charset="0"/>
                             </a:rPr>
                             <m:t>𝑄</m:t>
@@ -6869,19 +6946,19 @@
                         </m:e>
                         <m:sub>
                           <m:r>
-                            <a:rPr lang="it-IT" b="0" i="1" smtClean="0">
+                            <a:rPr lang="en-US" b="0" i="1" noProof="0" smtClean="0">
                               <a:latin typeface="Cambria Math" panose="02040503050406030204" pitchFamily="18" charset="0"/>
                             </a:rPr>
                             <m:t>𝑖</m:t>
                           </m:r>
                           <m:r>
-                            <a:rPr lang="it-IT" b="0" i="1" smtClean="0">
+                            <a:rPr lang="en-US" b="0" i="1" noProof="0" smtClean="0">
                               <a:latin typeface="Cambria Math" panose="02040503050406030204" pitchFamily="18" charset="0"/>
                             </a:rPr>
                             <m:t>,</m:t>
                           </m:r>
                           <m:r>
-                            <a:rPr lang="it-IT" b="0" i="1" smtClean="0">
+                            <a:rPr lang="en-US" b="0" i="1" noProof="0" smtClean="0">
                               <a:latin typeface="Cambria Math" panose="02040503050406030204" pitchFamily="18" charset="0"/>
                             </a:rPr>
                             <m:t>𝑗</m:t>
@@ -6889,7 +6966,7 @@
                         </m:sub>
                         <m:sup>
                           <m:r>
-                            <a:rPr lang="it-IT" b="0" i="1" smtClean="0">
+                            <a:rPr lang="en-US" b="0" i="1" noProof="0" smtClean="0">
                               <a:latin typeface="Cambria Math" panose="02040503050406030204" pitchFamily="18" charset="0"/>
                             </a:rPr>
                             <m:t>𝑛</m:t>
@@ -6897,7 +6974,7 @@
                         </m:sup>
                       </m:sSubSup>
                       <m:r>
-                        <a:rPr lang="it-IT" b="0" i="1" smtClean="0">
+                        <a:rPr lang="en-US" b="0" i="1" noProof="0" smtClean="0">
                           <a:latin typeface="Cambria Math" panose="02040503050406030204" pitchFamily="18" charset="0"/>
                         </a:rPr>
                         <m:t>−</m:t>
@@ -6905,7 +6982,7 @@
                       <m:f>
                         <m:fPr>
                           <m:ctrlPr>
-                            <a:rPr lang="it-IT" b="0" i="1" smtClean="0">
+                            <a:rPr lang="en-US" b="0" i="1" noProof="0" smtClean="0">
                               <a:latin typeface="Cambria Math" panose="02040503050406030204" pitchFamily="18" charset="0"/>
                             </a:rPr>
                           </m:ctrlPr>
@@ -6915,13 +6992,13 @@
                             <m:rPr>
                               <m:sty m:val="p"/>
                             </m:rPr>
-                            <a:rPr lang="it-IT" b="0" i="0" smtClean="0">
+                            <a:rPr lang="en-US" b="0" i="0" noProof="0" smtClean="0">
                               <a:latin typeface="Cambria Math" panose="02040503050406030204" pitchFamily="18" charset="0"/>
                             </a:rPr>
                             <m:t>Δ</m:t>
                           </m:r>
                           <m:r>
-                            <a:rPr lang="it-IT" b="0" i="1" smtClean="0">
+                            <a:rPr lang="en-US" b="0" i="1" noProof="0" smtClean="0">
                               <a:latin typeface="Cambria Math" panose="02040503050406030204" pitchFamily="18" charset="0"/>
                             </a:rPr>
                             <m:t>𝑥</m:t>
@@ -6932,13 +7009,13 @@
                             <m:rPr>
                               <m:sty m:val="p"/>
                             </m:rPr>
-                            <a:rPr lang="it-IT" b="0" i="0" smtClean="0">
+                            <a:rPr lang="en-US" b="0" i="0" noProof="0" smtClean="0">
                               <a:latin typeface="Cambria Math" panose="02040503050406030204" pitchFamily="18" charset="0"/>
                             </a:rPr>
                             <m:t>Δ</m:t>
                           </m:r>
                           <m:r>
-                            <a:rPr lang="it-IT" b="0" i="1" smtClean="0">
+                            <a:rPr lang="en-US" b="0" i="1" noProof="0" smtClean="0">
                               <a:latin typeface="Cambria Math" panose="02040503050406030204" pitchFamily="18" charset="0"/>
                             </a:rPr>
                             <m:t>𝑡</m:t>
@@ -6948,7 +7025,7 @@
                       <m:d>
                         <m:dPr>
                           <m:ctrlPr>
-                            <a:rPr lang="it-IT" b="0" i="1" smtClean="0">
+                            <a:rPr lang="en-US" b="0" i="1" noProof="0" smtClean="0">
                               <a:latin typeface="Cambria Math" panose="02040503050406030204" pitchFamily="18" charset="0"/>
                             </a:rPr>
                           </m:ctrlPr>
@@ -6957,14 +7034,14 @@
                           <m:sSub>
                             <m:sSubPr>
                               <m:ctrlPr>
-                                <a:rPr lang="it-IT" b="0" i="1" smtClean="0">
+                                <a:rPr lang="en-US" b="0" i="1" noProof="0" smtClean="0">
                                   <a:latin typeface="Cambria Math" panose="02040503050406030204" pitchFamily="18" charset="0"/>
                                 </a:rPr>
                               </m:ctrlPr>
                             </m:sSubPr>
                             <m:e>
                               <m:r>
-                                <a:rPr lang="it-IT" b="0" i="1" smtClean="0">
+                                <a:rPr lang="en-US" b="0" i="1" noProof="0" smtClean="0">
                                   <a:latin typeface="Cambria Math" panose="02040503050406030204" pitchFamily="18" charset="0"/>
                                 </a:rPr>
                                 <m:t>𝐷</m:t>
@@ -6972,13 +7049,13 @@
                             </m:e>
                             <m:sub>
                               <m:r>
-                                <a:rPr lang="it-IT" b="0" i="1" smtClean="0">
+                                <a:rPr lang="en-US" b="0" i="1" noProof="0" smtClean="0">
                                   <a:latin typeface="Cambria Math" panose="02040503050406030204" pitchFamily="18" charset="0"/>
                                 </a:rPr>
                                 <m:t>𝑖</m:t>
                               </m:r>
                               <m:r>
-                                <a:rPr lang="it-IT" b="0" i="1" smtClean="0">
+                                <a:rPr lang="en-US" b="0" i="1" noProof="0" smtClean="0">
                                   <a:latin typeface="Cambria Math" panose="02040503050406030204" pitchFamily="18" charset="0"/>
                                 </a:rPr>
                                 <m:t>+</m:t>
@@ -6986,14 +7063,14 @@
                               <m:f>
                                 <m:fPr>
                                   <m:ctrlPr>
-                                    <a:rPr lang="it-IT" b="0" i="1" smtClean="0">
+                                    <a:rPr lang="en-US" b="0" i="1" noProof="0" smtClean="0">
                                       <a:latin typeface="Cambria Math" panose="02040503050406030204" pitchFamily="18" charset="0"/>
                                     </a:rPr>
                                   </m:ctrlPr>
                                 </m:fPr>
                                 <m:num>
                                   <m:r>
-                                    <a:rPr lang="it-IT" b="0" i="1" smtClean="0">
+                                    <a:rPr lang="en-US" b="0" i="1" noProof="0" smtClean="0">
                                       <a:latin typeface="Cambria Math" panose="02040503050406030204" pitchFamily="18" charset="0"/>
                                     </a:rPr>
                                     <m:t>1</m:t>
@@ -7001,7 +7078,7 @@
                                 </m:num>
                                 <m:den>
                                   <m:r>
-                                    <a:rPr lang="it-IT" b="0" i="1" smtClean="0">
+                                    <a:rPr lang="en-US" b="0" i="1" noProof="0" smtClean="0">
                                       <a:latin typeface="Cambria Math" panose="02040503050406030204" pitchFamily="18" charset="0"/>
                                     </a:rPr>
                                     <m:t>2</m:t>
@@ -7009,13 +7086,13 @@
                                 </m:den>
                               </m:f>
                               <m:r>
-                                <a:rPr lang="it-IT" b="0" i="1" smtClean="0">
+                                <a:rPr lang="en-US" b="0" i="1" noProof="0" smtClean="0">
                                   <a:latin typeface="Cambria Math" panose="02040503050406030204" pitchFamily="18" charset="0"/>
                                 </a:rPr>
                                 <m:t>,</m:t>
                               </m:r>
                               <m:r>
-                                <a:rPr lang="it-IT" b="0" i="1" smtClean="0">
+                                <a:rPr lang="en-US" b="0" i="1" noProof="0" smtClean="0">
                                   <a:latin typeface="Cambria Math" panose="02040503050406030204" pitchFamily="18" charset="0"/>
                                 </a:rPr>
                                 <m:t>𝑗</m:t>
@@ -7023,7 +7100,7 @@
                             </m:sub>
                           </m:sSub>
                           <m:r>
-                            <a:rPr lang="it-IT" b="0" i="1" smtClean="0">
+                            <a:rPr lang="en-US" b="0" i="1" noProof="0" smtClean="0">
                               <a:latin typeface="Cambria Math" panose="02040503050406030204" pitchFamily="18" charset="0"/>
                             </a:rPr>
                             <m:t>+</m:t>
@@ -7031,14 +7108,14 @@
                           <m:sSub>
                             <m:sSubPr>
                               <m:ctrlPr>
-                                <a:rPr lang="it-IT" b="0" i="1" smtClean="0">
+                                <a:rPr lang="en-US" b="0" i="1" noProof="0" smtClean="0">
                                   <a:latin typeface="Cambria Math" panose="02040503050406030204" pitchFamily="18" charset="0"/>
                                 </a:rPr>
                               </m:ctrlPr>
                             </m:sSubPr>
                             <m:e>
                               <m:r>
-                                <a:rPr lang="it-IT" b="0" i="1" smtClean="0">
+                                <a:rPr lang="en-US" b="0" i="1" noProof="0" smtClean="0">
                                   <a:latin typeface="Cambria Math" panose="02040503050406030204" pitchFamily="18" charset="0"/>
                                 </a:rPr>
                                 <m:t>𝐷</m:t>
@@ -7046,13 +7123,13 @@
                             </m:e>
                             <m:sub>
                               <m:r>
-                                <a:rPr lang="it-IT" b="0" i="1" smtClean="0">
+                                <a:rPr lang="en-US" b="0" i="1" noProof="0" smtClean="0">
                                   <a:latin typeface="Cambria Math" panose="02040503050406030204" pitchFamily="18" charset="0"/>
                                 </a:rPr>
                                 <m:t>𝑖</m:t>
                               </m:r>
                               <m:r>
-                                <a:rPr lang="it-IT" b="0" i="1" smtClean="0">
+                                <a:rPr lang="en-US" b="0" i="1" noProof="0" smtClean="0">
                                   <a:latin typeface="Cambria Math" panose="02040503050406030204" pitchFamily="18" charset="0"/>
                                 </a:rPr>
                                 <m:t>−</m:t>
@@ -7060,14 +7137,14 @@
                               <m:f>
                                 <m:fPr>
                                   <m:ctrlPr>
-                                    <a:rPr lang="it-IT" b="0" i="1" smtClean="0">
+                                    <a:rPr lang="en-US" b="0" i="1" noProof="0" smtClean="0">
                                       <a:latin typeface="Cambria Math" panose="02040503050406030204" pitchFamily="18" charset="0"/>
                                     </a:rPr>
                                   </m:ctrlPr>
                                 </m:fPr>
                                 <m:num>
                                   <m:r>
-                                    <a:rPr lang="it-IT" b="0" i="1" smtClean="0">
+                                    <a:rPr lang="en-US" b="0" i="1" noProof="0" smtClean="0">
                                       <a:latin typeface="Cambria Math" panose="02040503050406030204" pitchFamily="18" charset="0"/>
                                     </a:rPr>
                                     <m:t>1</m:t>
@@ -7075,7 +7152,7 @@
                                 </m:num>
                                 <m:den>
                                   <m:r>
-                                    <a:rPr lang="it-IT" b="0" i="1" smtClean="0">
+                                    <a:rPr lang="en-US" b="0" i="1" noProof="0" smtClean="0">
                                       <a:latin typeface="Cambria Math" panose="02040503050406030204" pitchFamily="18" charset="0"/>
                                     </a:rPr>
                                     <m:t>2</m:t>
@@ -7083,13 +7160,13 @@
                                 </m:den>
                               </m:f>
                               <m:r>
-                                <a:rPr lang="it-IT" b="0" i="1" smtClean="0">
+                                <a:rPr lang="en-US" b="0" i="1" noProof="0" smtClean="0">
                                   <a:latin typeface="Cambria Math" panose="02040503050406030204" pitchFamily="18" charset="0"/>
                                 </a:rPr>
                                 <m:t>,</m:t>
                               </m:r>
                               <m:r>
-                                <a:rPr lang="it-IT" b="0" i="1" smtClean="0">
+                                <a:rPr lang="en-US" b="0" i="1" noProof="0" smtClean="0">
                                   <a:latin typeface="Cambria Math" panose="02040503050406030204" pitchFamily="18" charset="0"/>
                                 </a:rPr>
                                 <m:t>𝑗</m:t>
@@ -7099,7 +7176,7 @@
                         </m:e>
                       </m:d>
                       <m:r>
-                        <a:rPr lang="it-IT" b="0" i="1" smtClean="0">
+                        <a:rPr lang="en-US" b="0" i="1" noProof="0" smtClean="0">
                           <a:latin typeface="Cambria Math" panose="02040503050406030204" pitchFamily="18" charset="0"/>
                         </a:rPr>
                         <m:t>−</m:t>
@@ -7107,7 +7184,7 @@
                       <m:f>
                         <m:fPr>
                           <m:ctrlPr>
-                            <a:rPr lang="it-IT" i="1">
+                            <a:rPr lang="en-US" i="1" noProof="0" smtClean="0">
                               <a:latin typeface="Cambria Math" panose="02040503050406030204" pitchFamily="18" charset="0"/>
                             </a:rPr>
                           </m:ctrlPr>
@@ -7117,13 +7194,13 @@
                             <m:rPr>
                               <m:sty m:val="p"/>
                             </m:rPr>
-                            <a:rPr lang="it-IT">
+                            <a:rPr lang="en-US" noProof="0" smtClean="0">
                               <a:latin typeface="Cambria Math" panose="02040503050406030204" pitchFamily="18" charset="0"/>
                             </a:rPr>
                             <m:t>Δ</m:t>
                           </m:r>
                           <m:r>
-                            <a:rPr lang="it-IT" b="0" i="1" smtClean="0">
+                            <a:rPr lang="en-US" b="0" i="1" noProof="0" smtClean="0">
                               <a:latin typeface="Cambria Math" panose="02040503050406030204" pitchFamily="18" charset="0"/>
                             </a:rPr>
                             <m:t>𝑦</m:t>
@@ -7134,13 +7211,13 @@
                             <m:rPr>
                               <m:sty m:val="p"/>
                             </m:rPr>
-                            <a:rPr lang="it-IT">
+                            <a:rPr lang="en-US" noProof="0" smtClean="0">
                               <a:latin typeface="Cambria Math" panose="02040503050406030204" pitchFamily="18" charset="0"/>
                             </a:rPr>
                             <m:t>Δ</m:t>
                           </m:r>
                           <m:r>
-                            <a:rPr lang="it-IT" i="1">
+                            <a:rPr lang="en-US" i="1" noProof="0" smtClean="0">
                               <a:latin typeface="Cambria Math" panose="02040503050406030204" pitchFamily="18" charset="0"/>
                             </a:rPr>
                             <m:t>𝑡</m:t>
@@ -7150,7 +7227,7 @@
                       <m:d>
                         <m:dPr>
                           <m:ctrlPr>
-                            <a:rPr lang="it-IT" i="1">
+                            <a:rPr lang="en-US" i="1" noProof="0" smtClean="0">
                               <a:latin typeface="Cambria Math" panose="02040503050406030204" pitchFamily="18" charset="0"/>
                             </a:rPr>
                           </m:ctrlPr>
@@ -7159,14 +7236,14 @@
                           <m:sSub>
                             <m:sSubPr>
                               <m:ctrlPr>
-                                <a:rPr lang="it-IT" i="1">
+                                <a:rPr lang="en-US" i="1" noProof="0" smtClean="0">
                                   <a:latin typeface="Cambria Math" panose="02040503050406030204" pitchFamily="18" charset="0"/>
                                 </a:rPr>
                               </m:ctrlPr>
                             </m:sSubPr>
                             <m:e>
                               <m:r>
-                                <a:rPr lang="it-IT" i="1">
+                                <a:rPr lang="en-US" i="1" noProof="0" smtClean="0">
                                   <a:latin typeface="Cambria Math" panose="02040503050406030204" pitchFamily="18" charset="0"/>
                                 </a:rPr>
                                 <m:t>𝐷</m:t>
@@ -7174,25 +7251,25 @@
                             </m:e>
                             <m:sub>
                               <m:r>
-                                <a:rPr lang="it-IT" b="0" i="1" smtClean="0">
+                                <a:rPr lang="en-US" b="0" i="1" noProof="0" smtClean="0">
                                   <a:latin typeface="Cambria Math" panose="02040503050406030204" pitchFamily="18" charset="0"/>
                                 </a:rPr>
                                 <m:t>𝑖</m:t>
                               </m:r>
                               <m:r>
-                                <a:rPr lang="it-IT" b="0" i="1" smtClean="0">
+                                <a:rPr lang="en-US" b="0" i="1" noProof="0" smtClean="0">
                                   <a:latin typeface="Cambria Math" panose="02040503050406030204" pitchFamily="18" charset="0"/>
                                 </a:rPr>
                                 <m:t>,</m:t>
                               </m:r>
                               <m:r>
-                                <a:rPr lang="it-IT" b="0" i="1" smtClean="0">
+                                <a:rPr lang="en-US" b="0" i="1" noProof="0" smtClean="0">
                                   <a:latin typeface="Cambria Math" panose="02040503050406030204" pitchFamily="18" charset="0"/>
                                 </a:rPr>
                                 <m:t>𝑗</m:t>
                               </m:r>
                               <m:r>
-                                <a:rPr lang="it-IT" i="1">
+                                <a:rPr lang="en-US" i="1" noProof="0" smtClean="0">
                                   <a:latin typeface="Cambria Math" panose="02040503050406030204" pitchFamily="18" charset="0"/>
                                 </a:rPr>
                                 <m:t>+</m:t>
@@ -7200,14 +7277,14 @@
                               <m:f>
                                 <m:fPr>
                                   <m:ctrlPr>
-                                    <a:rPr lang="it-IT" i="1">
+                                    <a:rPr lang="en-US" i="1" noProof="0" smtClean="0">
                                       <a:latin typeface="Cambria Math" panose="02040503050406030204" pitchFamily="18" charset="0"/>
                                     </a:rPr>
                                   </m:ctrlPr>
                                 </m:fPr>
                                 <m:num>
                                   <m:r>
-                                    <a:rPr lang="it-IT" i="1">
+                                    <a:rPr lang="en-US" i="1" noProof="0" smtClean="0">
                                       <a:latin typeface="Cambria Math" panose="02040503050406030204" pitchFamily="18" charset="0"/>
                                     </a:rPr>
                                     <m:t>1</m:t>
@@ -7215,7 +7292,7 @@
                                 </m:num>
                                 <m:den>
                                   <m:r>
-                                    <a:rPr lang="it-IT" i="1">
+                                    <a:rPr lang="en-US" i="1" noProof="0" smtClean="0">
                                       <a:latin typeface="Cambria Math" panose="02040503050406030204" pitchFamily="18" charset="0"/>
                                     </a:rPr>
                                     <m:t>2</m:t>
@@ -7225,7 +7302,7 @@
                             </m:sub>
                           </m:sSub>
                           <m:r>
-                            <a:rPr lang="it-IT" i="1">
+                            <a:rPr lang="en-US" i="1" noProof="0" smtClean="0">
                               <a:latin typeface="Cambria Math" panose="02040503050406030204" pitchFamily="18" charset="0"/>
                             </a:rPr>
                             <m:t>+</m:t>
@@ -7233,14 +7310,14 @@
                           <m:sSub>
                             <m:sSubPr>
                               <m:ctrlPr>
-                                <a:rPr lang="it-IT" i="1">
+                                <a:rPr lang="en-US" i="1" noProof="0" smtClean="0">
                                   <a:latin typeface="Cambria Math" panose="02040503050406030204" pitchFamily="18" charset="0"/>
                                 </a:rPr>
                               </m:ctrlPr>
                             </m:sSubPr>
                             <m:e>
                               <m:r>
-                                <a:rPr lang="it-IT" i="1">
+                                <a:rPr lang="en-US" i="1" noProof="0" smtClean="0">
                                   <a:latin typeface="Cambria Math" panose="02040503050406030204" pitchFamily="18" charset="0"/>
                                 </a:rPr>
                                 <m:t>𝐷</m:t>
@@ -7248,25 +7325,25 @@
                             </m:e>
                             <m:sub>
                               <m:r>
-                                <a:rPr lang="it-IT" i="1">
+                                <a:rPr lang="en-US" i="1" noProof="0" smtClean="0">
                                   <a:latin typeface="Cambria Math" panose="02040503050406030204" pitchFamily="18" charset="0"/>
                                 </a:rPr>
                                 <m:t>𝑖</m:t>
                               </m:r>
                               <m:r>
-                                <a:rPr lang="it-IT" b="0" i="1" smtClean="0">
+                                <a:rPr lang="en-US" b="0" i="1" noProof="0" smtClean="0">
                                   <a:latin typeface="Cambria Math" panose="02040503050406030204" pitchFamily="18" charset="0"/>
                                 </a:rPr>
                                 <m:t>,</m:t>
                               </m:r>
                               <m:r>
-                                <a:rPr lang="it-IT" b="0" i="1" smtClean="0">
+                                <a:rPr lang="en-US" b="0" i="1" noProof="0" smtClean="0">
                                   <a:latin typeface="Cambria Math" panose="02040503050406030204" pitchFamily="18" charset="0"/>
                                 </a:rPr>
                                 <m:t>𝑗</m:t>
                               </m:r>
                               <m:r>
-                                <a:rPr lang="it-IT" i="1">
+                                <a:rPr lang="en-US" i="1" noProof="0" smtClean="0">
                                   <a:latin typeface="Cambria Math" panose="02040503050406030204" pitchFamily="18" charset="0"/>
                                 </a:rPr>
                                 <m:t>−</m:t>
@@ -7274,14 +7351,14 @@
                               <m:f>
                                 <m:fPr>
                                   <m:ctrlPr>
-                                    <a:rPr lang="it-IT" i="1">
+                                    <a:rPr lang="en-US" i="1" noProof="0" smtClean="0">
                                       <a:latin typeface="Cambria Math" panose="02040503050406030204" pitchFamily="18" charset="0"/>
                                     </a:rPr>
                                   </m:ctrlPr>
                                 </m:fPr>
                                 <m:num>
                                   <m:r>
-                                    <a:rPr lang="it-IT" i="1">
+                                    <a:rPr lang="en-US" i="1" noProof="0" smtClean="0">
                                       <a:latin typeface="Cambria Math" panose="02040503050406030204" pitchFamily="18" charset="0"/>
                                     </a:rPr>
                                     <m:t>1</m:t>
@@ -7289,7 +7366,7 @@
                                 </m:num>
                                 <m:den>
                                   <m:r>
-                                    <a:rPr lang="it-IT" i="1">
+                                    <a:rPr lang="en-US" i="1" noProof="0" smtClean="0">
                                       <a:latin typeface="Cambria Math" panose="02040503050406030204" pitchFamily="18" charset="0"/>
                                     </a:rPr>
                                     <m:t>2</m:t>
@@ -7303,7 +7380,7 @@
                     </m:oMath>
                   </m:oMathPara>
                 </a14:m>
-                <a:endParaRPr lang="en-GB" dirty="0"/>
+                <a:endParaRPr lang="en-US" noProof="0" dirty="0"/>
               </a:p>
               <a:p>
                 <a:pPr/>
@@ -7316,14 +7393,14 @@
                       <m:sSub>
                         <m:sSubPr>
                           <m:ctrlPr>
-                            <a:rPr lang="it-IT" b="0" i="1" smtClean="0">
+                            <a:rPr lang="en-US" b="0" i="1" noProof="0" smtClean="0">
                               <a:latin typeface="Cambria Math" panose="02040503050406030204" pitchFamily="18" charset="0"/>
                             </a:rPr>
                           </m:ctrlPr>
                         </m:sSubPr>
                         <m:e>
                           <m:r>
-                            <a:rPr lang="it-IT" b="0" i="1" smtClean="0">
+                            <a:rPr lang="en-US" b="0" i="1" noProof="0" smtClean="0">
                               <a:latin typeface="Cambria Math" panose="02040503050406030204" pitchFamily="18" charset="0"/>
                             </a:rPr>
                             <m:t>𝐷</m:t>
@@ -7331,13 +7408,13 @@
                         </m:e>
                         <m:sub>
                           <m:r>
-                            <a:rPr lang="it-IT" b="0" i="1" smtClean="0">
+                            <a:rPr lang="en-US" b="0" i="1" noProof="0" smtClean="0">
                               <a:latin typeface="Cambria Math" panose="02040503050406030204" pitchFamily="18" charset="0"/>
                             </a:rPr>
                             <m:t>𝑖</m:t>
                           </m:r>
                           <m:r>
-                            <a:rPr lang="it-IT" b="0" i="1" smtClean="0">
+                            <a:rPr lang="en-US" b="0" i="1" noProof="0" smtClean="0">
                               <a:latin typeface="Cambria Math" panose="02040503050406030204" pitchFamily="18" charset="0"/>
                               <a:ea typeface="Cambria Math" panose="02040503050406030204" pitchFamily="18" charset="0"/>
                             </a:rPr>
@@ -7346,14 +7423,14 @@
                           <m:f>
                             <m:fPr>
                               <m:ctrlPr>
-                                <a:rPr lang="it-IT" b="0" i="1" smtClean="0">
+                                <a:rPr lang="en-US" b="0" i="1" noProof="0" smtClean="0">
                                   <a:latin typeface="Cambria Math" panose="02040503050406030204" pitchFamily="18" charset="0"/>
                                 </a:rPr>
                               </m:ctrlPr>
                             </m:fPr>
                             <m:num>
                               <m:r>
-                                <a:rPr lang="it-IT" b="0" i="1" smtClean="0">
+                                <a:rPr lang="en-US" b="0" i="1" noProof="0" smtClean="0">
                                   <a:latin typeface="Cambria Math" panose="02040503050406030204" pitchFamily="18" charset="0"/>
                                 </a:rPr>
                                 <m:t>1</m:t>
@@ -7361,7 +7438,7 @@
                             </m:num>
                             <m:den>
                               <m:r>
-                                <a:rPr lang="it-IT" b="0" i="1" smtClean="0">
+                                <a:rPr lang="en-US" b="0" i="1" noProof="0" smtClean="0">
                                   <a:latin typeface="Cambria Math" panose="02040503050406030204" pitchFamily="18" charset="0"/>
                                 </a:rPr>
                                 <m:t>2</m:t>
@@ -7369,13 +7446,13 @@
                             </m:den>
                           </m:f>
                           <m:r>
-                            <a:rPr lang="it-IT" b="0" i="1" smtClean="0">
+                            <a:rPr lang="en-US" b="0" i="1" noProof="0" smtClean="0">
                               <a:latin typeface="Cambria Math" panose="02040503050406030204" pitchFamily="18" charset="0"/>
                             </a:rPr>
                             <m:t>,</m:t>
                           </m:r>
                           <m:r>
-                            <a:rPr lang="it-IT" b="0" i="1" smtClean="0">
+                            <a:rPr lang="en-US" b="0" i="1" noProof="0" smtClean="0">
                               <a:latin typeface="Cambria Math" panose="02040503050406030204" pitchFamily="18" charset="0"/>
                             </a:rPr>
                             <m:t>𝑗</m:t>
@@ -7383,7 +7460,7 @@
                         </m:sub>
                       </m:sSub>
                       <m:r>
-                        <a:rPr lang="it-IT" b="0" i="1" smtClean="0">
+                        <a:rPr lang="en-US" b="0" i="1" noProof="0" smtClean="0">
                           <a:latin typeface="Cambria Math" panose="02040503050406030204" pitchFamily="18" charset="0"/>
                         </a:rPr>
                         <m:t>=</m:t>
@@ -7392,7 +7469,7 @@
                         <m:naryPr>
                           <m:chr m:val="∑"/>
                           <m:ctrlPr>
-                            <a:rPr lang="it-IT" b="0" i="1" smtClean="0">
+                            <a:rPr lang="en-US" b="0" i="1" noProof="0" smtClean="0">
                               <a:latin typeface="Cambria Math" panose="02040503050406030204" pitchFamily="18" charset="0"/>
                             </a:rPr>
                           </m:ctrlPr>
@@ -7402,13 +7479,13 @@
                             <m:rPr>
                               <m:brk m:alnAt="23"/>
                             </m:rPr>
-                            <a:rPr lang="it-IT" b="0" i="1" smtClean="0">
+                            <a:rPr lang="en-US" b="0" i="1" noProof="0" smtClean="0">
                               <a:latin typeface="Cambria Math" panose="02040503050406030204" pitchFamily="18" charset="0"/>
                             </a:rPr>
                             <m:t>𝑘</m:t>
                           </m:r>
                           <m:r>
-                            <a:rPr lang="it-IT" b="0" i="1" smtClean="0">
+                            <a:rPr lang="en-US" b="0" i="1" noProof="0" smtClean="0">
                               <a:latin typeface="Cambria Math" panose="02040503050406030204" pitchFamily="18" charset="0"/>
                             </a:rPr>
                             <m:t>=1</m:t>
@@ -7416,7 +7493,7 @@
                         </m:sub>
                         <m:sup>
                           <m:r>
-                            <a:rPr lang="it-IT" b="0" i="1" smtClean="0">
+                            <a:rPr lang="en-US" b="0" i="1" noProof="0" smtClean="0">
                               <a:latin typeface="Cambria Math" panose="02040503050406030204" pitchFamily="18" charset="0"/>
                             </a:rPr>
                             <m:t>𝑛𝐺𝑃</m:t>
@@ -7426,14 +7503,14 @@
                           <m:sSub>
                             <m:sSubPr>
                               <m:ctrlPr>
-                                <a:rPr lang="it-IT" b="0" i="1" smtClean="0">
+                                <a:rPr lang="en-US" b="0" i="1" noProof="0" smtClean="0">
                                   <a:latin typeface="Cambria Math" panose="02040503050406030204" pitchFamily="18" charset="0"/>
                                 </a:rPr>
                               </m:ctrlPr>
                             </m:sSubPr>
                             <m:e>
                               <m:r>
-                                <a:rPr lang="it-IT" b="0" i="1" smtClean="0">
+                                <a:rPr lang="en-US" b="0" i="1" noProof="0" smtClean="0">
                                   <a:latin typeface="Cambria Math" panose="02040503050406030204" pitchFamily="18" charset="0"/>
                                 </a:rPr>
                                 <m:t>𝑤</m:t>
@@ -7441,7 +7518,7 @@
                             </m:e>
                             <m:sub>
                               <m:r>
-                                <a:rPr lang="it-IT" b="0" i="1" smtClean="0">
+                                <a:rPr lang="en-US" b="0" i="1" noProof="0" smtClean="0">
                                   <a:latin typeface="Cambria Math" panose="02040503050406030204" pitchFamily="18" charset="0"/>
                                 </a:rPr>
                                 <m:t>𝑘</m:t>
@@ -7449,7 +7526,7 @@
                             </m:sub>
                           </m:sSub>
                           <m:r>
-                            <a:rPr lang="it-IT" b="0" i="1" smtClean="0">
+                            <a:rPr lang="en-US" b="0" i="1" noProof="0" smtClean="0">
                               <a:latin typeface="Cambria Math" panose="02040503050406030204" pitchFamily="18" charset="0"/>
                             </a:rPr>
                             <m:t> </m:t>
@@ -7457,7 +7534,7 @@
                           <m:d>
                             <m:dPr>
                               <m:ctrlPr>
-                                <a:rPr lang="it-IT" b="0" i="1" smtClean="0">
+                                <a:rPr lang="en-US" b="0" i="1" noProof="0" smtClean="0">
                                   <a:latin typeface="Cambria Math" panose="02040503050406030204" pitchFamily="18" charset="0"/>
                                 </a:rPr>
                               </m:ctrlPr>
@@ -7466,14 +7543,14 @@
                               <m:sSub>
                                 <m:sSubPr>
                                   <m:ctrlPr>
-                                    <a:rPr lang="it-IT" b="0" i="1" smtClean="0">
+                                    <a:rPr lang="en-US" b="0" i="1" noProof="0" smtClean="0">
                                       <a:latin typeface="Cambria Math" panose="02040503050406030204" pitchFamily="18" charset="0"/>
                                     </a:rPr>
                                   </m:ctrlPr>
                                 </m:sSubPr>
                                 <m:e>
                                   <m:r>
-                                    <a:rPr lang="it-IT" b="0" i="1" smtClean="0">
+                                    <a:rPr lang="en-US" b="0" i="1" noProof="0" smtClean="0">
                                       <a:latin typeface="Cambria Math" panose="02040503050406030204" pitchFamily="18" charset="0"/>
                                     </a:rPr>
                                     <m:t>𝐴</m:t>
@@ -7481,31 +7558,31 @@
                                 </m:e>
                                 <m:sub>
                                   <m:r>
-                                    <a:rPr lang="it-IT" b="0" i="1" smtClean="0">
+                                    <a:rPr lang="en-US" b="0" i="1" noProof="0" smtClean="0">
                                       <a:latin typeface="Cambria Math" panose="02040503050406030204" pitchFamily="18" charset="0"/>
                                     </a:rPr>
                                     <m:t>𝑖</m:t>
                                   </m:r>
                                   <m:r>
-                                    <a:rPr lang="it-IT" b="0" i="1" smtClean="0">
+                                    <a:rPr lang="en-US" b="0" i="1" noProof="0" smtClean="0">
                                       <a:latin typeface="Cambria Math" panose="02040503050406030204" pitchFamily="18" charset="0"/>
                                     </a:rPr>
                                     <m:t>,</m:t>
                                   </m:r>
                                   <m:r>
-                                    <a:rPr lang="it-IT" b="0" i="1" smtClean="0">
+                                    <a:rPr lang="en-US" b="0" i="1" noProof="0" smtClean="0">
                                       <a:latin typeface="Cambria Math" panose="02040503050406030204" pitchFamily="18" charset="0"/>
                                     </a:rPr>
                                     <m:t>𝑗</m:t>
                                   </m:r>
                                   <m:r>
-                                    <a:rPr lang="it-IT" b="0" i="1" smtClean="0">
+                                    <a:rPr lang="en-US" b="0" i="1" noProof="0" smtClean="0">
                                       <a:latin typeface="Cambria Math" panose="02040503050406030204" pitchFamily="18" charset="0"/>
                                     </a:rPr>
                                     <m:t>,</m:t>
                                   </m:r>
                                   <m:r>
-                                    <a:rPr lang="it-IT" b="0" i="1" smtClean="0">
+                                    <a:rPr lang="en-US" b="0" i="1" noProof="0" smtClean="0">
                                       <a:latin typeface="Cambria Math" panose="02040503050406030204" pitchFamily="18" charset="0"/>
                                     </a:rPr>
                                     <m:t>𝑘</m:t>
@@ -7513,7 +7590,7 @@
                                 </m:sub>
                               </m:sSub>
                               <m:r>
-                                <a:rPr lang="it-IT" b="0" i="1" smtClean="0">
+                                <a:rPr lang="en-US" b="0" i="1" noProof="0" smtClean="0">
                                   <a:latin typeface="Cambria Math" panose="02040503050406030204" pitchFamily="18" charset="0"/>
                                   <a:ea typeface="Cambria Math" panose="02040503050406030204" pitchFamily="18" charset="0"/>
                                 </a:rPr>
@@ -7522,7 +7599,7 @@
                               <m:sSub>
                                 <m:sSubPr>
                                   <m:ctrlPr>
-                                    <a:rPr lang="it-IT" b="0" i="1" smtClean="0">
+                                    <a:rPr lang="en-US" b="0" i="1" noProof="0" smtClean="0">
                                       <a:latin typeface="Cambria Math" panose="02040503050406030204" pitchFamily="18" charset="0"/>
                                       <a:ea typeface="Cambria Math" panose="02040503050406030204" pitchFamily="18" charset="0"/>
                                     </a:rPr>
@@ -7530,7 +7607,7 @@
                                 </m:sSubPr>
                                 <m:e>
                                   <m:r>
-                                    <a:rPr lang="it-IT" b="0" i="1" smtClean="0">
+                                    <a:rPr lang="en-US" b="0" i="1" noProof="0" smtClean="0">
                                       <a:latin typeface="Cambria Math" panose="02040503050406030204" pitchFamily="18" charset="0"/>
                                       <a:ea typeface="Cambria Math" panose="02040503050406030204" pitchFamily="18" charset="0"/>
                                     </a:rPr>
@@ -7539,35 +7616,35 @@
                                 </m:e>
                                 <m:sub>
                                   <m:r>
-                                    <a:rPr lang="it-IT" b="0" i="1" smtClean="0">
+                                    <a:rPr lang="en-US" b="0" i="1" noProof="0" smtClean="0">
                                       <a:latin typeface="Cambria Math" panose="02040503050406030204" pitchFamily="18" charset="0"/>
                                       <a:ea typeface="Cambria Math" panose="02040503050406030204" pitchFamily="18" charset="0"/>
                                     </a:rPr>
                                     <m:t>𝑖</m:t>
                                   </m:r>
                                   <m:r>
-                                    <a:rPr lang="it-IT" b="0" i="1" smtClean="0">
+                                    <a:rPr lang="en-US" b="0" i="1" noProof="0" smtClean="0">
                                       <a:latin typeface="Cambria Math" panose="02040503050406030204" pitchFamily="18" charset="0"/>
                                       <a:ea typeface="Cambria Math" panose="02040503050406030204" pitchFamily="18" charset="0"/>
                                     </a:rPr>
                                     <m:t>,</m:t>
                                   </m:r>
                                   <m:r>
-                                    <a:rPr lang="it-IT" b="0" i="1" smtClean="0">
+                                    <a:rPr lang="en-US" b="0" i="1" noProof="0" smtClean="0">
                                       <a:latin typeface="Cambria Math" panose="02040503050406030204" pitchFamily="18" charset="0"/>
                                       <a:ea typeface="Cambria Math" panose="02040503050406030204" pitchFamily="18" charset="0"/>
                                     </a:rPr>
                                     <m:t>𝑗</m:t>
                                   </m:r>
                                   <m:r>
-                                    <a:rPr lang="it-IT" b="0" i="1" smtClean="0">
+                                    <a:rPr lang="en-US" b="0" i="1" noProof="0" smtClean="0">
                                       <a:latin typeface="Cambria Math" panose="02040503050406030204" pitchFamily="18" charset="0"/>
                                       <a:ea typeface="Cambria Math" panose="02040503050406030204" pitchFamily="18" charset="0"/>
                                     </a:rPr>
                                     <m:t>,</m:t>
                                   </m:r>
                                   <m:r>
-                                    <a:rPr lang="it-IT" b="0" i="1" smtClean="0">
+                                    <a:rPr lang="en-US" b="0" i="1" noProof="0" smtClean="0">
                                       <a:latin typeface="Cambria Math" panose="02040503050406030204" pitchFamily="18" charset="0"/>
                                       <a:ea typeface="Cambria Math" panose="02040503050406030204" pitchFamily="18" charset="0"/>
                                     </a:rPr>
@@ -7576,7 +7653,7 @@
                                 </m:sub>
                               </m:sSub>
                               <m:r>
-                                <a:rPr lang="it-IT" b="0" i="1" smtClean="0">
+                                <a:rPr lang="en-US" b="0" i="1" noProof="0" smtClean="0">
                                   <a:latin typeface="Cambria Math" panose="02040503050406030204" pitchFamily="18" charset="0"/>
                                   <a:ea typeface="Cambria Math" panose="02040503050406030204" pitchFamily="18" charset="0"/>
                                 </a:rPr>
@@ -7589,7 +7666,7 @@
                       <m:sSub>
                         <m:sSubPr>
                           <m:ctrlPr>
-                            <a:rPr lang="it-IT" b="0" i="1" smtClean="0">
+                            <a:rPr lang="en-US" b="0" i="1" noProof="0" smtClean="0">
                               <a:latin typeface="Cambria Math" panose="02040503050406030204" pitchFamily="18" charset="0"/>
                             </a:rPr>
                           </m:ctrlPr>
@@ -7599,13 +7676,13 @@
                             <m:rPr>
                               <m:sty m:val="p"/>
                             </m:rPr>
-                            <a:rPr lang="it-IT" b="0" i="0" smtClean="0">
+                            <a:rPr lang="en-US" b="0" i="0" noProof="0" smtClean="0">
                               <a:latin typeface="Cambria Math" panose="02040503050406030204" pitchFamily="18" charset="0"/>
                             </a:rPr>
                             <m:t>Δ</m:t>
                           </m:r>
                           <m:r>
-                            <a:rPr lang="it-IT" b="0" i="1" smtClean="0">
+                            <a:rPr lang="en-US" b="0" i="1" noProof="0" smtClean="0">
                               <a:latin typeface="Cambria Math" panose="02040503050406030204" pitchFamily="18" charset="0"/>
                             </a:rPr>
                             <m:t>𝑄</m:t>
@@ -7613,19 +7690,19 @@
                         </m:e>
                         <m:sub>
                           <m:r>
-                            <a:rPr lang="it-IT" b="0" i="1" smtClean="0">
+                            <a:rPr lang="en-US" b="0" i="1" noProof="0" smtClean="0">
                               <a:latin typeface="Cambria Math" panose="02040503050406030204" pitchFamily="18" charset="0"/>
                             </a:rPr>
                             <m:t>𝑖</m:t>
                           </m:r>
                           <m:r>
-                            <a:rPr lang="it-IT" b="0" i="1" smtClean="0">
+                            <a:rPr lang="en-US" b="0" i="1" noProof="0" smtClean="0">
                               <a:latin typeface="Cambria Math" panose="02040503050406030204" pitchFamily="18" charset="0"/>
                             </a:rPr>
                             <m:t>,</m:t>
                           </m:r>
                           <m:r>
-                            <a:rPr lang="it-IT" b="0" i="1" smtClean="0">
+                            <a:rPr lang="en-US" b="0" i="1" noProof="0" smtClean="0">
                               <a:latin typeface="Cambria Math" panose="02040503050406030204" pitchFamily="18" charset="0"/>
                             </a:rPr>
                             <m:t>𝑗</m:t>
@@ -7635,7 +7712,7 @@
                     </m:oMath>
                   </m:oMathPara>
                 </a14:m>
-                <a:endParaRPr lang="it-IT" b="0" dirty="0"/>
+                <a:endParaRPr lang="en-US" b="0" noProof="0" dirty="0"/>
               </a:p>
               <a:p>
                 <a:pPr/>
@@ -7648,14 +7725,14 @@
                       <m:sSub>
                         <m:sSubPr>
                           <m:ctrlPr>
-                            <a:rPr lang="it-IT" b="0" i="1" smtClean="0">
+                            <a:rPr lang="en-US" b="0" i="1" noProof="0" smtClean="0">
                               <a:latin typeface="Cambria Math" panose="02040503050406030204" pitchFamily="18" charset="0"/>
                             </a:rPr>
                           </m:ctrlPr>
                         </m:sSubPr>
                         <m:e>
                           <m:r>
-                            <a:rPr lang="it-IT" b="0" i="1" smtClean="0">
+                            <a:rPr lang="en-US" b="0" i="1" noProof="0" smtClean="0">
                               <a:latin typeface="Cambria Math" panose="02040503050406030204" pitchFamily="18" charset="0"/>
                             </a:rPr>
                             <m:t>𝐴</m:t>
@@ -7663,31 +7740,31 @@
                         </m:e>
                         <m:sub>
                           <m:r>
-                            <a:rPr lang="it-IT" b="0" i="1" smtClean="0">
+                            <a:rPr lang="en-US" b="0" i="1" noProof="0" smtClean="0">
                               <a:latin typeface="Cambria Math" panose="02040503050406030204" pitchFamily="18" charset="0"/>
                             </a:rPr>
                             <m:t>𝑖</m:t>
                           </m:r>
                           <m:r>
-                            <a:rPr lang="it-IT" b="0" i="1" smtClean="0">
+                            <a:rPr lang="en-US" b="0" i="1" noProof="0" smtClean="0">
                               <a:latin typeface="Cambria Math" panose="02040503050406030204" pitchFamily="18" charset="0"/>
                             </a:rPr>
                             <m:t>,</m:t>
                           </m:r>
                           <m:r>
-                            <a:rPr lang="it-IT" b="0" i="1" smtClean="0">
+                            <a:rPr lang="en-US" b="0" i="1" noProof="0" smtClean="0">
                               <a:latin typeface="Cambria Math" panose="02040503050406030204" pitchFamily="18" charset="0"/>
                             </a:rPr>
                             <m:t>𝑗</m:t>
                           </m:r>
                           <m:r>
-                            <a:rPr lang="it-IT" b="0" i="1" smtClean="0">
+                            <a:rPr lang="en-US" b="0" i="1" noProof="0" smtClean="0">
                               <a:latin typeface="Cambria Math" panose="02040503050406030204" pitchFamily="18" charset="0"/>
                             </a:rPr>
                             <m:t>,</m:t>
                           </m:r>
                           <m:r>
-                            <a:rPr lang="it-IT" b="0" i="1" smtClean="0">
+                            <a:rPr lang="en-US" b="0" i="1" noProof="0" smtClean="0">
                               <a:latin typeface="Cambria Math" panose="02040503050406030204" pitchFamily="18" charset="0"/>
                             </a:rPr>
                             <m:t>𝑘</m:t>
@@ -7695,13 +7772,13 @@
                         </m:sub>
                       </m:sSub>
                       <m:r>
-                        <a:rPr lang="it-IT" b="0" i="1" smtClean="0">
+                        <a:rPr lang="en-US" b="0" i="1" noProof="0" smtClean="0">
                           <a:latin typeface="Cambria Math" panose="02040503050406030204" pitchFamily="18" charset="0"/>
                         </a:rPr>
                         <m:t>=</m:t>
                       </m:r>
                       <m:r>
-                        <a:rPr lang="it-IT" b="0" i="1" smtClean="0">
+                        <a:rPr lang="en-US" b="0" i="1" noProof="0" smtClean="0">
                           <a:latin typeface="Cambria Math" panose="02040503050406030204" pitchFamily="18" charset="0"/>
                         </a:rPr>
                         <m:t>𝐴</m:t>
@@ -7709,7 +7786,7 @@
                       <m:d>
                         <m:dPr>
                           <m:ctrlPr>
-                            <a:rPr lang="it-IT" b="0" i="1" smtClean="0">
+                            <a:rPr lang="en-US" b="0" i="1" noProof="0" smtClean="0">
                               <a:latin typeface="Cambria Math" panose="02040503050406030204" pitchFamily="18" charset="0"/>
                             </a:rPr>
                           </m:ctrlPr>
@@ -7718,14 +7795,14 @@
                           <m:sSub>
                             <m:sSubPr>
                               <m:ctrlPr>
-                                <a:rPr lang="it-IT" b="0" i="1" smtClean="0">
+                                <a:rPr lang="en-US" b="0" i="1" noProof="0" smtClean="0">
                                   <a:latin typeface="Cambria Math" panose="02040503050406030204" pitchFamily="18" charset="0"/>
                                 </a:rPr>
                               </m:ctrlPr>
                             </m:sSubPr>
                             <m:e>
                               <m:r>
-                                <a:rPr lang="it-IT" b="0" i="1" smtClean="0">
+                                <a:rPr lang="en-US" b="0" i="1" noProof="0" smtClean="0">
                                   <a:latin typeface="Cambria Math" panose="02040503050406030204" pitchFamily="18" charset="0"/>
                                 </a:rPr>
                                 <m:t>𝑄</m:t>
@@ -7733,31 +7810,31 @@
                             </m:e>
                             <m:sub>
                               <m:r>
-                                <a:rPr lang="it-IT" b="0" i="1" smtClean="0">
+                                <a:rPr lang="en-US" b="0" i="1" noProof="0" smtClean="0">
                                   <a:latin typeface="Cambria Math" panose="02040503050406030204" pitchFamily="18" charset="0"/>
                                 </a:rPr>
                                 <m:t>𝑖</m:t>
                               </m:r>
                               <m:r>
-                                <a:rPr lang="it-IT" b="0" i="1" smtClean="0">
+                                <a:rPr lang="en-US" b="0" i="1" noProof="0" smtClean="0">
                                   <a:latin typeface="Cambria Math" panose="02040503050406030204" pitchFamily="18" charset="0"/>
                                 </a:rPr>
                                 <m:t>,</m:t>
                               </m:r>
                               <m:r>
-                                <a:rPr lang="it-IT" b="0" i="1" smtClean="0">
+                                <a:rPr lang="en-US" b="0" i="1" noProof="0" smtClean="0">
                                   <a:latin typeface="Cambria Math" panose="02040503050406030204" pitchFamily="18" charset="0"/>
                                 </a:rPr>
                                 <m:t>𝑗</m:t>
                               </m:r>
                               <m:r>
-                                <a:rPr lang="it-IT" b="0" i="1" smtClean="0">
+                                <a:rPr lang="en-US" b="0" i="1" noProof="0" smtClean="0">
                                   <a:latin typeface="Cambria Math" panose="02040503050406030204" pitchFamily="18" charset="0"/>
                                 </a:rPr>
                                 <m:t>,</m:t>
                               </m:r>
                               <m:r>
-                                <a:rPr lang="it-IT" b="0" i="1" smtClean="0">
+                                <a:rPr lang="en-US" b="0" i="1" noProof="0" smtClean="0">
                                   <a:latin typeface="Cambria Math" panose="02040503050406030204" pitchFamily="18" charset="0"/>
                                 </a:rPr>
                                 <m:t>𝑘</m:t>
@@ -7767,43 +7844,43 @@
                         </m:e>
                       </m:d>
                       <m:r>
-                        <a:rPr lang="it-IT" b="0" i="1" smtClean="0">
+                        <a:rPr lang="en-US" b="0" i="1" noProof="0" smtClean="0">
                           <a:latin typeface="Cambria Math" panose="02040503050406030204" pitchFamily="18" charset="0"/>
                         </a:rPr>
                         <m:t>      </m:t>
                       </m:r>
                       <m:r>
-                        <a:rPr lang="it-IT" b="0" i="1" smtClean="0">
+                        <a:rPr lang="en-US" b="0" i="1" noProof="0" smtClean="0">
                           <a:latin typeface="Cambria Math" panose="02040503050406030204" pitchFamily="18" charset="0"/>
                         </a:rPr>
                         <m:t>𝑓𝑜𝑟</m:t>
                       </m:r>
                       <m:r>
-                        <a:rPr lang="it-IT" b="0" i="1" smtClean="0">
+                        <a:rPr lang="en-US" b="0" i="1" noProof="0" smtClean="0">
                           <a:latin typeface="Cambria Math" panose="02040503050406030204" pitchFamily="18" charset="0"/>
                         </a:rPr>
                         <m:t> </m:t>
                       </m:r>
                       <m:r>
-                        <a:rPr lang="it-IT" b="0" i="1" smtClean="0">
+                        <a:rPr lang="en-US" b="0" i="1" noProof="0" smtClean="0">
                           <a:latin typeface="Cambria Math" panose="02040503050406030204" pitchFamily="18" charset="0"/>
                         </a:rPr>
                         <m:t>𝑘</m:t>
                       </m:r>
                       <m:r>
-                        <a:rPr lang="it-IT" b="0" i="1" smtClean="0">
+                        <a:rPr lang="en-US" b="0" i="1" noProof="0" smtClean="0">
                           <a:latin typeface="Cambria Math" panose="02040503050406030204" pitchFamily="18" charset="0"/>
                         </a:rPr>
                         <m:t>=1, …, </m:t>
                       </m:r>
                       <m:r>
-                        <a:rPr lang="it-IT" b="0" i="1" smtClean="0">
+                        <a:rPr lang="en-US" b="0" i="1" noProof="0" smtClean="0">
                           <a:latin typeface="Cambria Math" panose="02040503050406030204" pitchFamily="18" charset="0"/>
                         </a:rPr>
                         <m:t>𝑛𝐺𝑃</m:t>
                       </m:r>
                       <m:r>
-                        <a:rPr lang="it-IT" b="0" i="1" smtClean="0">
+                        <a:rPr lang="en-US" b="0" i="1" noProof="0" smtClean="0">
                           <a:latin typeface="Cambria Math" panose="02040503050406030204" pitchFamily="18" charset="0"/>
                         </a:rPr>
                         <m:t> </m:t>
@@ -7811,12 +7888,12 @@
                     </m:oMath>
                   </m:oMathPara>
                 </a14:m>
-                <a:endParaRPr lang="it-IT" b="0" dirty="0"/>
+                <a:endParaRPr lang="en-US" b="0" noProof="0" dirty="0"/>
               </a:p>
             </p:txBody>
           </p:sp>
         </mc:Choice>
-        <mc:Fallback xmlns="">
+        <mc:Fallback>
           <p:sp>
             <p:nvSpPr>
               <p:cNvPr id="3" name="CasellaDiTesto 2">
@@ -7851,7 +7928,7 @@
               <a:lstStyle/>
               <a:p>
                 <a:r>
-                  <a:rPr lang="en-GB">
+                  <a:rPr lang="en-US">
                     <a:noFill/>
                   </a:rPr>
                   <a:t> </a:t>
@@ -7918,10 +7995,10 @@
           <a:lstStyle/>
           <a:p>
             <a:fld id="{619A0612-47CE-46C5-A28E-F10D87CAACAD}" type="slidenum">
-              <a:rPr lang="en-GB" smtClean="0"/>
+              <a:rPr lang="en-US" noProof="0" smtClean="0"/>
               <a:t>6</a:t>
             </a:fld>
-            <a:endParaRPr lang="en-GB"/>
+            <a:endParaRPr lang="en-US" noProof="0" dirty="0"/>
           </a:p>
         </p:txBody>
       </p:sp>
@@ -7984,10 +8061,9 @@
           <a:lstStyle/>
           <a:p>
             <a:r>
-              <a:rPr lang="en-US" sz="3200" b="1" dirty="0"/>
+              <a:rPr lang="en-US" sz="3200" b="1" noProof="0" dirty="0"/>
               <a:t>Motivation about the scheme</a:t>
             </a:r>
-            <a:endParaRPr lang="en-US" sz="3200" b="1" noProof="0" dirty="0"/>
           </a:p>
         </p:txBody>
       </p:sp>
@@ -8049,10 +8125,10 @@
           <a:lstStyle/>
           <a:p>
             <a:fld id="{619A0612-47CE-46C5-A28E-F10D87CAACAD}" type="slidenum">
-              <a:rPr lang="en-GB" smtClean="0"/>
+              <a:rPr lang="en-US" noProof="0" smtClean="0"/>
               <a:t>7</a:t>
             </a:fld>
-            <a:endParaRPr lang="en-GB"/>
+            <a:endParaRPr lang="en-US" noProof="0" dirty="0"/>
           </a:p>
         </p:txBody>
       </p:sp>
@@ -8085,7 +8161,7 @@
           <a:lstStyle/>
           <a:p>
             <a:r>
-              <a:rPr lang="en-US" dirty="0"/>
+              <a:rPr lang="en-US" noProof="0" dirty="0"/>
               <a:t>Characteristics of the scheme:</a:t>
             </a:r>
           </a:p>
@@ -8116,11 +8192,7 @@
             </a:pPr>
             <a:r>
               <a:rPr lang="en-US" noProof="0" dirty="0"/>
-              <a:t>Flexible </a:t>
-            </a:r>
-            <a:r>
-              <a:rPr lang="en-US" dirty="0"/>
-              <a:t>for each hyperbolic system (from a coding viewpoint)</a:t>
+              <a:t>Flexible for each hyperbolic system (from a coding viewpoint)</a:t>
             </a:r>
           </a:p>
           <a:p>
@@ -8140,7 +8212,6 @@
               <a:rPr lang="en-US" noProof="0" dirty="0"/>
               <a:t> of the equations</a:t>
             </a:r>
-            <a:endParaRPr lang="en-US" dirty="0"/>
           </a:p>
           <a:p>
             <a:pPr marL="285750" indent="-285750">
@@ -8149,11 +8220,7 @@
             </a:pPr>
             <a:r>
               <a:rPr lang="en-US" noProof="0" dirty="0"/>
-              <a:t>Reliable, especially for</a:t>
-            </a:r>
-            <a:r>
-              <a:rPr lang="en-US" dirty="0"/>
-              <a:t> shock waves and sharp solutions</a:t>
+              <a:t>Reliable, especially for shock waves and sharp solutions</a:t>
             </a:r>
           </a:p>
           <a:p>
@@ -8165,10 +8232,9 @@
           </a:p>
           <a:p>
             <a:r>
-              <a:rPr lang="en-US" dirty="0"/>
+              <a:rPr lang="en-US" noProof="0" dirty="0"/>
               <a:t>The core of the code can be very nice optimized and used for any hyperbolic system of PDE!</a:t>
             </a:r>
-            <a:endParaRPr lang="en-US" noProof="0" dirty="0"/>
           </a:p>
         </p:txBody>
       </p:sp>
@@ -8258,7 +8324,7 @@
           <p:nvPr/>
         </p:nvPicPr>
         <p:blipFill>
-          <a:blip r:embed="rId2">
+          <a:blip r:embed="rId3">
             <a:extLst>
               <a:ext uri="{28A0092B-C50C-407E-A947-70E740481C1C}">
                 <a14:useLocalDpi xmlns:a14="http://schemas.microsoft.com/office/drawing/2010/main" val="0"/>
@@ -8301,10 +8367,10 @@
           <a:lstStyle/>
           <a:p>
             <a:fld id="{619A0612-47CE-46C5-A28E-F10D87CAACAD}" type="slidenum">
-              <a:rPr lang="en-GB" smtClean="0"/>
+              <a:rPr lang="en-US" noProof="0" smtClean="0"/>
               <a:t>8</a:t>
             </a:fld>
-            <a:endParaRPr lang="en-GB"/>
+            <a:endParaRPr lang="en-US" noProof="0" dirty="0"/>
           </a:p>
         </p:txBody>
       </p:sp>
@@ -8337,45 +8403,626 @@
           <a:lstStyle/>
           <a:p>
             <a:r>
-              <a:rPr lang="it-IT" dirty="0"/>
-              <a:t>First </a:t>
-            </a:r>
-            <a:r>
-              <a:rPr lang="it-IT" dirty="0" err="1"/>
-              <a:t>we</a:t>
-            </a:r>
-            <a:r>
-              <a:rPr lang="it-IT" dirty="0"/>
-              <a:t> can compare the time for solving the </a:t>
-            </a:r>
-            <a:r>
-              <a:rPr lang="it-IT" dirty="0" err="1"/>
-              <a:t>same</a:t>
-            </a:r>
-            <a:r>
-              <a:rPr lang="it-IT" dirty="0"/>
-              <a:t> </a:t>
-            </a:r>
-            <a:r>
-              <a:rPr lang="it-IT" dirty="0" err="1"/>
-              <a:t>problem</a:t>
-            </a:r>
-            <a:r>
-              <a:rPr lang="it-IT" dirty="0"/>
-              <a:t> for the Three </a:t>
-            </a:r>
-            <a:r>
-              <a:rPr lang="it-IT" dirty="0" err="1"/>
-              <a:t>codes</a:t>
-            </a:r>
-            <a:r>
-              <a:rPr lang="it-IT" dirty="0"/>
-              <a:t>:</a:t>
-            </a:r>
-            <a:endParaRPr lang="en-US" dirty="0"/>
+              <a:rPr lang="en-US" noProof="0" dirty="0"/>
+              <a:t>First we can compare the time for solving the same problem for the Three codes:</a:t>
+            </a:r>
           </a:p>
         </p:txBody>
       </p:sp>
+      <p:graphicFrame>
+        <p:nvGraphicFramePr>
+          <p:cNvPr id="8" name="Table 7">
+            <a:extLst>
+              <a:ext uri="{FF2B5EF4-FFF2-40B4-BE49-F238E27FC236}">
+                <a16:creationId xmlns:a16="http://schemas.microsoft.com/office/drawing/2014/main" id="{C9BE9334-E014-5C0B-0DFF-CAF34AD38175}"/>
+              </a:ext>
+            </a:extLst>
+          </p:cNvPr>
+          <p:cNvGraphicFramePr>
+            <a:graphicFrameLocks noGrp="1"/>
+          </p:cNvGraphicFramePr>
+          <p:nvPr>
+            <p:extLst>
+              <p:ext uri="{D42A27DB-BD31-4B8C-83A1-F6EECF244321}">
+                <p14:modId xmlns:p14="http://schemas.microsoft.com/office/powerpoint/2010/main" val="4187522939"/>
+              </p:ext>
+            </p:extLst>
+          </p:nvPr>
+        </p:nvGraphicFramePr>
+        <p:xfrm>
+          <a:off x="1582582" y="2862831"/>
+          <a:ext cx="9026835" cy="2595880"/>
+        </p:xfrm>
+        <a:graphic>
+          <a:graphicData uri="http://schemas.openxmlformats.org/drawingml/2006/table">
+            <a:tbl>
+              <a:tblPr firstRow="1" bandRow="1">
+                <a:tableStyleId>{C083E6E3-FA7D-4D7B-A595-EF9225AFEA82}</a:tableStyleId>
+              </a:tblPr>
+              <a:tblGrid>
+                <a:gridCol w="1805367">
+                  <a:extLst>
+                    <a:ext uri="{9D8B030D-6E8A-4147-A177-3AD203B41FA5}">
+                      <a16:colId xmlns:a16="http://schemas.microsoft.com/office/drawing/2014/main" val="3066828244"/>
+                    </a:ext>
+                  </a:extLst>
+                </a:gridCol>
+                <a:gridCol w="1805367">
+                  <a:extLst>
+                    <a:ext uri="{9D8B030D-6E8A-4147-A177-3AD203B41FA5}">
+                      <a16:colId xmlns:a16="http://schemas.microsoft.com/office/drawing/2014/main" val="2502450074"/>
+                    </a:ext>
+                  </a:extLst>
+                </a:gridCol>
+                <a:gridCol w="1805367">
+                  <a:extLst>
+                    <a:ext uri="{9D8B030D-6E8A-4147-A177-3AD203B41FA5}">
+                      <a16:colId xmlns:a16="http://schemas.microsoft.com/office/drawing/2014/main" val="2070603827"/>
+                    </a:ext>
+                  </a:extLst>
+                </a:gridCol>
+                <a:gridCol w="1805367">
+                  <a:extLst>
+                    <a:ext uri="{9D8B030D-6E8A-4147-A177-3AD203B41FA5}">
+                      <a16:colId xmlns:a16="http://schemas.microsoft.com/office/drawing/2014/main" val="973124656"/>
+                    </a:ext>
+                  </a:extLst>
+                </a:gridCol>
+                <a:gridCol w="1805367">
+                  <a:extLst>
+                    <a:ext uri="{9D8B030D-6E8A-4147-A177-3AD203B41FA5}">
+                      <a16:colId xmlns:a16="http://schemas.microsoft.com/office/drawing/2014/main" val="3210079575"/>
+                    </a:ext>
+                  </a:extLst>
+                </a:gridCol>
+              </a:tblGrid>
+              <a:tr h="370840">
+                <a:tc>
+                  <a:txBody>
+                    <a:bodyPr/>
+                    <a:lstStyle/>
+                    <a:p>
+                      <a:pPr algn="ctr"/>
+                      <a:r>
+                        <a:rPr lang="en-US" noProof="0" dirty="0"/>
+                        <a:t>TIMES (s)</a:t>
+                      </a:r>
+                    </a:p>
+                  </a:txBody>
+                  <a:tcPr/>
+                </a:tc>
+                <a:tc>
+                  <a:txBody>
+                    <a:bodyPr/>
+                    <a:lstStyle/>
+                    <a:p>
+                      <a:pPr algn="ctr"/>
+                      <a:r>
+                        <a:rPr lang="en-US" noProof="0" dirty="0"/>
+                        <a:t>MATLAB</a:t>
+                      </a:r>
+                    </a:p>
+                  </a:txBody>
+                  <a:tcPr/>
+                </a:tc>
+                <a:tc>
+                  <a:txBody>
+                    <a:bodyPr/>
+                    <a:lstStyle/>
+                    <a:p>
+                      <a:pPr algn="ctr"/>
+                      <a:r>
+                        <a:rPr lang="en-US" noProof="0" dirty="0"/>
+                        <a:t>JULIA CPU</a:t>
+                      </a:r>
+                    </a:p>
+                  </a:txBody>
+                  <a:tcPr/>
+                </a:tc>
+                <a:tc>
+                  <a:txBody>
+                    <a:bodyPr/>
+                    <a:lstStyle/>
+                    <a:p>
+                      <a:pPr algn="ctr"/>
+                      <a:r>
+                        <a:rPr lang="en-US" noProof="0" dirty="0"/>
+                        <a:t>JULIA GPU</a:t>
+                      </a:r>
+                    </a:p>
+                  </a:txBody>
+                  <a:tcPr/>
+                </a:tc>
+                <a:tc>
+                  <a:txBody>
+                    <a:bodyPr/>
+                    <a:lstStyle/>
+                    <a:p>
+                      <a:pPr algn="ctr"/>
+                      <a:r>
+                        <a:rPr lang="en-US" noProof="0" dirty="0"/>
+                        <a:t>JULIA GPU OPT</a:t>
+                      </a:r>
+                    </a:p>
+                  </a:txBody>
+                  <a:tcPr/>
+                </a:tc>
+                <a:extLst>
+                  <a:ext uri="{0D108BD9-81ED-4DB2-BD59-A6C34878D82A}">
+                    <a16:rowId xmlns:a16="http://schemas.microsoft.com/office/drawing/2014/main" val="3363776733"/>
+                  </a:ext>
+                </a:extLst>
+              </a:tr>
+              <a:tr h="370840">
+                <a:tc>
+                  <a:txBody>
+                    <a:bodyPr/>
+                    <a:lstStyle/>
+                    <a:p>
+                      <a:pPr algn="ctr"/>
+                      <a:r>
+                        <a:rPr lang="en-US" noProof="0" dirty="0"/>
+                        <a:t>1</a:t>
+                      </a:r>
+                    </a:p>
+                  </a:txBody>
+                  <a:tcPr/>
+                </a:tc>
+                <a:tc>
+                  <a:txBody>
+                    <a:bodyPr/>
+                    <a:lstStyle/>
+                    <a:p>
+                      <a:pPr algn="ctr"/>
+                      <a:r>
+                        <a:rPr lang="en-US" noProof="0" dirty="0"/>
+                        <a:t>177.67</a:t>
+                      </a:r>
+                    </a:p>
+                  </a:txBody>
+                  <a:tcPr/>
+                </a:tc>
+                <a:tc>
+                  <a:txBody>
+                    <a:bodyPr/>
+                    <a:lstStyle/>
+                    <a:p>
+                      <a:pPr algn="ctr"/>
+                      <a:r>
+                        <a:rPr lang="en-US" noProof="0" dirty="0"/>
+                        <a:t>16.94</a:t>
+                      </a:r>
+                    </a:p>
+                  </a:txBody>
+                  <a:tcPr/>
+                </a:tc>
+                <a:tc>
+                  <a:txBody>
+                    <a:bodyPr/>
+                    <a:lstStyle/>
+                    <a:p>
+                      <a:pPr algn="ctr"/>
+                      <a:r>
+                        <a:rPr lang="en-US" noProof="0" dirty="0"/>
+                        <a:t>1.34</a:t>
+                      </a:r>
+                    </a:p>
+                  </a:txBody>
+                  <a:tcPr/>
+                </a:tc>
+                <a:tc>
+                  <a:txBody>
+                    <a:bodyPr/>
+                    <a:lstStyle/>
+                    <a:p>
+                      <a:pPr algn="ctr"/>
+                      <a:r>
+                        <a:rPr lang="en-US" noProof="0" dirty="0"/>
+                        <a:t>0.64</a:t>
+                      </a:r>
+                    </a:p>
+                  </a:txBody>
+                  <a:tcPr/>
+                </a:tc>
+                <a:extLst>
+                  <a:ext uri="{0D108BD9-81ED-4DB2-BD59-A6C34878D82A}">
+                    <a16:rowId xmlns:a16="http://schemas.microsoft.com/office/drawing/2014/main" val="2850233163"/>
+                  </a:ext>
+                </a:extLst>
+              </a:tr>
+              <a:tr h="370840">
+                <a:tc>
+                  <a:txBody>
+                    <a:bodyPr/>
+                    <a:lstStyle/>
+                    <a:p>
+                      <a:pPr algn="ctr"/>
+                      <a:r>
+                        <a:rPr lang="en-US" noProof="0" dirty="0"/>
+                        <a:t>2</a:t>
+                      </a:r>
+                    </a:p>
+                  </a:txBody>
+                  <a:tcPr/>
+                </a:tc>
+                <a:tc>
+                  <a:txBody>
+                    <a:bodyPr/>
+                    <a:lstStyle/>
+                    <a:p>
+                      <a:pPr algn="ctr"/>
+                      <a:r>
+                        <a:rPr lang="en-US" noProof="0" dirty="0"/>
+                        <a:t>178.87</a:t>
+                      </a:r>
+                    </a:p>
+                  </a:txBody>
+                  <a:tcPr/>
+                </a:tc>
+                <a:tc>
+                  <a:txBody>
+                    <a:bodyPr/>
+                    <a:lstStyle/>
+                    <a:p>
+                      <a:pPr algn="ctr"/>
+                      <a:r>
+                        <a:rPr lang="en-US" noProof="0" dirty="0"/>
+                        <a:t>16.80</a:t>
+                      </a:r>
+                    </a:p>
+                  </a:txBody>
+                  <a:tcPr/>
+                </a:tc>
+                <a:tc>
+                  <a:txBody>
+                    <a:bodyPr/>
+                    <a:lstStyle/>
+                    <a:p>
+                      <a:pPr algn="ctr"/>
+                      <a:r>
+                        <a:rPr lang="en-US" noProof="0" dirty="0"/>
+                        <a:t>1.30</a:t>
+                      </a:r>
+                    </a:p>
+                  </a:txBody>
+                  <a:tcPr/>
+                </a:tc>
+                <a:tc>
+                  <a:txBody>
+                    <a:bodyPr/>
+                    <a:lstStyle/>
+                    <a:p>
+                      <a:pPr algn="ctr"/>
+                      <a:r>
+                        <a:rPr lang="en-US" noProof="0" dirty="0"/>
+                        <a:t>0.63</a:t>
+                      </a:r>
+                    </a:p>
+                  </a:txBody>
+                  <a:tcPr/>
+                </a:tc>
+                <a:extLst>
+                  <a:ext uri="{0D108BD9-81ED-4DB2-BD59-A6C34878D82A}">
+                    <a16:rowId xmlns:a16="http://schemas.microsoft.com/office/drawing/2014/main" val="4111949474"/>
+                  </a:ext>
+                </a:extLst>
+              </a:tr>
+              <a:tr h="370840">
+                <a:tc>
+                  <a:txBody>
+                    <a:bodyPr/>
+                    <a:lstStyle/>
+                    <a:p>
+                      <a:pPr algn="ctr"/>
+                      <a:r>
+                        <a:rPr lang="en-US" noProof="0" dirty="0"/>
+                        <a:t>3</a:t>
+                      </a:r>
+                    </a:p>
+                  </a:txBody>
+                  <a:tcPr/>
+                </a:tc>
+                <a:tc>
+                  <a:txBody>
+                    <a:bodyPr/>
+                    <a:lstStyle/>
+                    <a:p>
+                      <a:pPr algn="ctr"/>
+                      <a:r>
+                        <a:rPr lang="en-US" noProof="0" dirty="0"/>
+                        <a:t>181.41</a:t>
+                      </a:r>
+                    </a:p>
+                  </a:txBody>
+                  <a:tcPr/>
+                </a:tc>
+                <a:tc>
+                  <a:txBody>
+                    <a:bodyPr/>
+                    <a:lstStyle/>
+                    <a:p>
+                      <a:pPr algn="ctr"/>
+                      <a:r>
+                        <a:rPr lang="en-US" noProof="0" dirty="0"/>
+                        <a:t>16.85</a:t>
+                      </a:r>
+                    </a:p>
+                  </a:txBody>
+                  <a:tcPr/>
+                </a:tc>
+                <a:tc>
+                  <a:txBody>
+                    <a:bodyPr/>
+                    <a:lstStyle/>
+                    <a:p>
+                      <a:pPr algn="ctr"/>
+                      <a:r>
+                        <a:rPr lang="en-US" noProof="0" dirty="0"/>
+                        <a:t>1.33</a:t>
+                      </a:r>
+                    </a:p>
+                  </a:txBody>
+                  <a:tcPr/>
+                </a:tc>
+                <a:tc>
+                  <a:txBody>
+                    <a:bodyPr/>
+                    <a:lstStyle/>
+                    <a:p>
+                      <a:pPr algn="ctr"/>
+                      <a:r>
+                        <a:rPr lang="en-US" noProof="0" dirty="0"/>
+                        <a:t>0.63</a:t>
+                      </a:r>
+                    </a:p>
+                  </a:txBody>
+                  <a:tcPr/>
+                </a:tc>
+                <a:extLst>
+                  <a:ext uri="{0D108BD9-81ED-4DB2-BD59-A6C34878D82A}">
+                    <a16:rowId xmlns:a16="http://schemas.microsoft.com/office/drawing/2014/main" val="3266719424"/>
+                  </a:ext>
+                </a:extLst>
+              </a:tr>
+              <a:tr h="370840">
+                <a:tc>
+                  <a:txBody>
+                    <a:bodyPr/>
+                    <a:lstStyle/>
+                    <a:p>
+                      <a:pPr algn="ctr"/>
+                      <a:r>
+                        <a:rPr lang="en-US" noProof="0" dirty="0"/>
+                        <a:t>4</a:t>
+                      </a:r>
+                    </a:p>
+                  </a:txBody>
+                  <a:tcPr/>
+                </a:tc>
+                <a:tc>
+                  <a:txBody>
+                    <a:bodyPr/>
+                    <a:lstStyle/>
+                    <a:p>
+                      <a:pPr algn="ctr"/>
+                      <a:r>
+                        <a:rPr lang="en-US" noProof="0" dirty="0"/>
+                        <a:t>177.99</a:t>
+                      </a:r>
+                    </a:p>
+                  </a:txBody>
+                  <a:tcPr/>
+                </a:tc>
+                <a:tc>
+                  <a:txBody>
+                    <a:bodyPr/>
+                    <a:lstStyle/>
+                    <a:p>
+                      <a:pPr algn="ctr"/>
+                      <a:r>
+                        <a:rPr lang="en-US" noProof="0" dirty="0"/>
+                        <a:t>16.87</a:t>
+                      </a:r>
+                    </a:p>
+                  </a:txBody>
+                  <a:tcPr/>
+                </a:tc>
+                <a:tc>
+                  <a:txBody>
+                    <a:bodyPr/>
+                    <a:lstStyle/>
+                    <a:p>
+                      <a:pPr algn="ctr"/>
+                      <a:r>
+                        <a:rPr lang="en-US" noProof="0" dirty="0"/>
+                        <a:t>1.29</a:t>
+                      </a:r>
+                    </a:p>
+                  </a:txBody>
+                  <a:tcPr/>
+                </a:tc>
+                <a:tc>
+                  <a:txBody>
+                    <a:bodyPr/>
+                    <a:lstStyle/>
+                    <a:p>
+                      <a:pPr algn="ctr"/>
+                      <a:r>
+                        <a:rPr lang="en-US" noProof="0" dirty="0"/>
+                        <a:t>0.63</a:t>
+                      </a:r>
+                    </a:p>
+                  </a:txBody>
+                  <a:tcPr/>
+                </a:tc>
+                <a:extLst>
+                  <a:ext uri="{0D108BD9-81ED-4DB2-BD59-A6C34878D82A}">
+                    <a16:rowId xmlns:a16="http://schemas.microsoft.com/office/drawing/2014/main" val="195689883"/>
+                  </a:ext>
+                </a:extLst>
+              </a:tr>
+              <a:tr h="370840">
+                <a:tc>
+                  <a:txBody>
+                    <a:bodyPr/>
+                    <a:lstStyle/>
+                    <a:p>
+                      <a:pPr algn="ctr"/>
+                      <a:r>
+                        <a:rPr lang="en-US" noProof="0" dirty="0"/>
+                        <a:t>5</a:t>
+                      </a:r>
+                    </a:p>
+                  </a:txBody>
+                  <a:tcPr/>
+                </a:tc>
+                <a:tc>
+                  <a:txBody>
+                    <a:bodyPr/>
+                    <a:lstStyle/>
+                    <a:p>
+                      <a:pPr algn="ctr"/>
+                      <a:r>
+                        <a:rPr lang="en-US" noProof="0" dirty="0"/>
+                        <a:t>177.22</a:t>
+                      </a:r>
+                    </a:p>
+                  </a:txBody>
+                  <a:tcPr/>
+                </a:tc>
+                <a:tc>
+                  <a:txBody>
+                    <a:bodyPr/>
+                    <a:lstStyle/>
+                    <a:p>
+                      <a:pPr algn="ctr"/>
+                      <a:r>
+                        <a:rPr lang="en-US" noProof="0" dirty="0"/>
+                        <a:t>16.88</a:t>
+                      </a:r>
+                    </a:p>
+                  </a:txBody>
+                  <a:tcPr/>
+                </a:tc>
+                <a:tc>
+                  <a:txBody>
+                    <a:bodyPr/>
+                    <a:lstStyle/>
+                    <a:p>
+                      <a:pPr algn="ctr"/>
+                      <a:r>
+                        <a:rPr lang="en-US" noProof="0" dirty="0"/>
+                        <a:t>1.29</a:t>
+                      </a:r>
+                    </a:p>
+                  </a:txBody>
+                  <a:tcPr/>
+                </a:tc>
+                <a:tc>
+                  <a:txBody>
+                    <a:bodyPr/>
+                    <a:lstStyle/>
+                    <a:p>
+                      <a:pPr algn="ctr"/>
+                      <a:r>
+                        <a:rPr lang="en-US" noProof="0" dirty="0"/>
+                        <a:t>0.63</a:t>
+                      </a:r>
+                    </a:p>
+                  </a:txBody>
+                  <a:tcPr/>
+                </a:tc>
+                <a:extLst>
+                  <a:ext uri="{0D108BD9-81ED-4DB2-BD59-A6C34878D82A}">
+                    <a16:rowId xmlns:a16="http://schemas.microsoft.com/office/drawing/2014/main" val="2064865055"/>
+                  </a:ext>
+                </a:extLst>
+              </a:tr>
+              <a:tr h="370840">
+                <a:tc>
+                  <a:txBody>
+                    <a:bodyPr/>
+                    <a:lstStyle/>
+                    <a:p>
+                      <a:pPr algn="ctr"/>
+                      <a:r>
+                        <a:rPr lang="en-US" b="1" noProof="0" dirty="0"/>
+                        <a:t>Average</a:t>
+                      </a:r>
+                    </a:p>
+                  </a:txBody>
+                  <a:tcPr/>
+                </a:tc>
+                <a:tc>
+                  <a:txBody>
+                    <a:bodyPr/>
+                    <a:lstStyle/>
+                    <a:p>
+                      <a:pPr algn="ctr"/>
+                      <a:r>
+                        <a:rPr lang="it-IT" b="1" noProof="0" dirty="0"/>
+                        <a:t>178.63</a:t>
+                      </a:r>
+                      <a:endParaRPr lang="en-US" b="1" noProof="0" dirty="0"/>
+                    </a:p>
+                  </a:txBody>
+                  <a:tcPr/>
+                </a:tc>
+                <a:tc>
+                  <a:txBody>
+                    <a:bodyPr/>
+                    <a:lstStyle/>
+                    <a:p>
+                      <a:pPr algn="ctr"/>
+                      <a:r>
+                        <a:rPr lang="it-IT" b="1" noProof="0" dirty="0"/>
+                        <a:t>16.87</a:t>
+                      </a:r>
+                      <a:endParaRPr lang="en-US" b="1" noProof="0" dirty="0"/>
+                    </a:p>
+                  </a:txBody>
+                  <a:tcPr/>
+                </a:tc>
+                <a:tc>
+                  <a:txBody>
+                    <a:bodyPr/>
+                    <a:lstStyle/>
+                    <a:p>
+                      <a:pPr algn="ctr"/>
+                      <a:r>
+                        <a:rPr lang="it-IT" b="1" noProof="0" dirty="0"/>
+                        <a:t>1.31</a:t>
+                      </a:r>
+                      <a:endParaRPr lang="en-US" b="1" noProof="0" dirty="0"/>
+                    </a:p>
+                  </a:txBody>
+                  <a:tcPr/>
+                </a:tc>
+                <a:tc>
+                  <a:txBody>
+                    <a:bodyPr/>
+                    <a:lstStyle/>
+                    <a:p>
+                      <a:pPr algn="ctr"/>
+                      <a:r>
+                        <a:rPr lang="it-IT" b="1" noProof="0" dirty="0"/>
+                        <a:t>0.63</a:t>
+                      </a:r>
+                      <a:endParaRPr lang="en-US" b="1" noProof="0" dirty="0"/>
+                    </a:p>
+                  </a:txBody>
+                  <a:tcPr/>
+                </a:tc>
+                <a:extLst>
+                  <a:ext uri="{0D108BD9-81ED-4DB2-BD59-A6C34878D82A}">
+                    <a16:rowId xmlns:a16="http://schemas.microsoft.com/office/drawing/2014/main" val="1148629674"/>
+                  </a:ext>
+                </a:extLst>
+              </a:tr>
+            </a:tbl>
+          </a:graphicData>
+        </a:graphic>
+      </p:graphicFrame>
     </p:spTree>
     <p:extLst>
       <p:ext uri="{BB962C8B-B14F-4D97-AF65-F5344CB8AC3E}">
@@ -8505,10 +9152,10 @@
           <a:lstStyle/>
           <a:p>
             <a:fld id="{619A0612-47CE-46C5-A28E-F10D87CAACAD}" type="slidenum">
-              <a:rPr lang="en-GB" smtClean="0"/>
+              <a:rPr lang="en-US" noProof="0" smtClean="0"/>
               <a:t>9</a:t>
             </a:fld>
-            <a:endParaRPr lang="en-GB"/>
+            <a:endParaRPr lang="en-US" noProof="0" dirty="0"/>
           </a:p>
         </p:txBody>
       </p:sp>
@@ -8543,7 +9190,7 @@
               <a:lstStyle/>
               <a:p>
                 <a:r>
-                  <a:rPr lang="en-US" dirty="0"/>
+                  <a:rPr lang="en-US" noProof="0" dirty="0"/>
                   <a:t>Since modern devices are memory bounded, a proper metric for evaluating performance must be developed. First, the unbalance between computational speed and memory access speed is evaluated as follows (values are referred to NVIDIA GeForce RTX 2080 Ti GPU):</a:t>
                 </a:r>
               </a:p>
@@ -8558,44 +9205,44 @@
                       <m:f>
                         <m:fPr>
                           <m:ctrlPr>
-                            <a:rPr lang="it-IT" b="0" i="1" smtClean="0">
+                            <a:rPr lang="en-US" b="0" i="1" noProof="0" smtClean="0">
                               <a:latin typeface="Cambria Math" panose="02040503050406030204" pitchFamily="18" charset="0"/>
                             </a:rPr>
                           </m:ctrlPr>
                         </m:fPr>
                         <m:num>
                           <m:r>
-                            <a:rPr lang="it-IT" b="0" i="1" smtClean="0">
+                            <a:rPr lang="en-US" b="0" i="1" noProof="0" smtClean="0">
                               <a:latin typeface="Cambria Math" panose="02040503050406030204" pitchFamily="18" charset="0"/>
                             </a:rPr>
                             <m:t>𝑐𝑜𝑚𝑝𝑢𝑡𝑎𝑡𝑖𝑜𝑛</m:t>
                           </m:r>
                           <m:r>
-                            <a:rPr lang="it-IT" b="0" i="1" smtClean="0">
+                            <a:rPr lang="en-US" b="0" i="1" noProof="0" smtClean="0">
                               <a:latin typeface="Cambria Math" panose="02040503050406030204" pitchFamily="18" charset="0"/>
                             </a:rPr>
                             <m:t> </m:t>
                           </m:r>
                           <m:r>
-                            <a:rPr lang="it-IT" b="0" i="1" smtClean="0">
+                            <a:rPr lang="en-US" b="0" i="1" noProof="0" smtClean="0">
                               <a:latin typeface="Cambria Math" panose="02040503050406030204" pitchFamily="18" charset="0"/>
                             </a:rPr>
                             <m:t>𝑝𝑒𝑎𝑘</m:t>
                           </m:r>
                           <m:r>
-                            <a:rPr lang="it-IT" b="0" i="1" smtClean="0">
+                            <a:rPr lang="en-US" b="0" i="1" noProof="0" smtClean="0">
                               <a:latin typeface="Cambria Math" panose="02040503050406030204" pitchFamily="18" charset="0"/>
                             </a:rPr>
                             <m:t> </m:t>
                           </m:r>
                           <m:r>
-                            <a:rPr lang="it-IT" b="0" i="1" smtClean="0">
+                            <a:rPr lang="en-US" b="0" i="1" noProof="0" smtClean="0">
                               <a:latin typeface="Cambria Math" panose="02040503050406030204" pitchFamily="18" charset="0"/>
                             </a:rPr>
                             <m:t>𝑝𝑒𝑟𝑓𝑜𝑟𝑚𝑎𝑛𝑐𝑒</m:t>
                           </m:r>
                           <m:r>
-                            <a:rPr lang="it-IT" b="0" i="1" smtClean="0">
+                            <a:rPr lang="en-US" b="0" i="1" noProof="0" smtClean="0">
                               <a:latin typeface="Cambria Math" panose="02040503050406030204" pitchFamily="18" charset="0"/>
                             </a:rPr>
                             <m:t> </m:t>
@@ -8605,7 +9252,7 @@
                               <m:begChr m:val="["/>
                               <m:endChr m:val="]"/>
                               <m:ctrlPr>
-                                <a:rPr lang="it-IT" b="0" i="1" smtClean="0">
+                                <a:rPr lang="en-US" b="0" i="1" noProof="0" smtClean="0">
                                   <a:latin typeface="Cambria Math" panose="02040503050406030204" pitchFamily="18" charset="0"/>
                                 </a:rPr>
                               </m:ctrlPr>
@@ -8614,14 +9261,14 @@
                               <m:f>
                                 <m:fPr>
                                   <m:ctrlPr>
-                                    <a:rPr lang="it-IT" b="0" i="1" smtClean="0">
+                                    <a:rPr lang="en-US" b="0" i="1" noProof="0" smtClean="0">
                                       <a:latin typeface="Cambria Math" panose="02040503050406030204" pitchFamily="18" charset="0"/>
                                     </a:rPr>
                                   </m:ctrlPr>
                                 </m:fPr>
                                 <m:num>
                                   <m:r>
-                                    <a:rPr lang="it-IT" b="0" i="1" smtClean="0">
+                                    <a:rPr lang="en-US" b="0" i="1" noProof="0" smtClean="0">
                                       <a:latin typeface="Cambria Math" panose="02040503050406030204" pitchFamily="18" charset="0"/>
                                     </a:rPr>
                                     <m:t>𝑇𝐹𝐿𝑂𝑃</m:t>
@@ -8629,7 +9276,7 @@
                                 </m:num>
                                 <m:den>
                                   <m:r>
-                                    <a:rPr lang="it-IT" b="0" i="1" smtClean="0">
+                                    <a:rPr lang="en-US" b="0" i="1" noProof="0" smtClean="0">
                                       <a:latin typeface="Cambria Math" panose="02040503050406030204" pitchFamily="18" charset="0"/>
                                     </a:rPr>
                                     <m:t>𝑠</m:t>
@@ -8641,49 +9288,49 @@
                         </m:num>
                         <m:den>
                           <m:r>
-                            <a:rPr lang="it-IT" b="0" i="1" smtClean="0">
+                            <a:rPr lang="en-US" b="0" i="1" noProof="0" smtClean="0">
                               <a:latin typeface="Cambria Math" panose="02040503050406030204" pitchFamily="18" charset="0"/>
                             </a:rPr>
                             <m:t>𝑚𝑒𝑚𝑜𝑟𝑦</m:t>
                           </m:r>
                           <m:r>
-                            <a:rPr lang="it-IT" b="0" i="1" smtClean="0">
+                            <a:rPr lang="en-US" b="0" i="1" noProof="0" smtClean="0">
                               <a:latin typeface="Cambria Math" panose="02040503050406030204" pitchFamily="18" charset="0"/>
                             </a:rPr>
                             <m:t> </m:t>
                           </m:r>
                           <m:r>
-                            <a:rPr lang="it-IT" b="0" i="1" smtClean="0">
+                            <a:rPr lang="en-US" b="0" i="1" noProof="0" smtClean="0">
                               <a:latin typeface="Cambria Math" panose="02040503050406030204" pitchFamily="18" charset="0"/>
                             </a:rPr>
                             <m:t>𝑎𝑐𝑐𝑒𝑠𝑠</m:t>
                           </m:r>
                           <m:r>
-                            <a:rPr lang="it-IT" b="0" i="1" smtClean="0">
+                            <a:rPr lang="en-US" b="0" i="1" noProof="0" smtClean="0">
                               <a:latin typeface="Cambria Math" panose="02040503050406030204" pitchFamily="18" charset="0"/>
                             </a:rPr>
                             <m:t> </m:t>
                           </m:r>
                           <m:r>
-                            <a:rPr lang="it-IT" b="0" i="1" smtClean="0">
+                            <a:rPr lang="en-US" b="0" i="1" noProof="0" smtClean="0">
                               <a:latin typeface="Cambria Math" panose="02040503050406030204" pitchFamily="18" charset="0"/>
                             </a:rPr>
                             <m:t>𝑝𝑒𝑎𝑘</m:t>
                           </m:r>
                           <m:r>
-                            <a:rPr lang="it-IT" b="0" i="1" smtClean="0">
+                            <a:rPr lang="en-US" b="0" i="1" noProof="0" smtClean="0">
                               <a:latin typeface="Cambria Math" panose="02040503050406030204" pitchFamily="18" charset="0"/>
                             </a:rPr>
                             <m:t> </m:t>
                           </m:r>
                           <m:r>
-                            <a:rPr lang="it-IT" b="0" i="1" smtClean="0">
+                            <a:rPr lang="en-US" b="0" i="1" noProof="0" smtClean="0">
                               <a:latin typeface="Cambria Math" panose="02040503050406030204" pitchFamily="18" charset="0"/>
                             </a:rPr>
                             <m:t>𝑝𝑒𝑟𝑓𝑜𝑟𝑚𝑎𝑛𝑐𝑒</m:t>
                           </m:r>
                           <m:r>
-                            <a:rPr lang="it-IT" b="0" i="1" smtClean="0">
+                            <a:rPr lang="en-US" b="0" i="1" noProof="0" smtClean="0">
                               <a:latin typeface="Cambria Math" panose="02040503050406030204" pitchFamily="18" charset="0"/>
                             </a:rPr>
                             <m:t> </m:t>
@@ -8693,7 +9340,7 @@
                               <m:begChr m:val="["/>
                               <m:endChr m:val="]"/>
                               <m:ctrlPr>
-                                <a:rPr lang="it-IT" b="0" i="1" smtClean="0">
+                                <a:rPr lang="en-US" b="0" i="1" noProof="0" smtClean="0">
                                   <a:latin typeface="Cambria Math" panose="02040503050406030204" pitchFamily="18" charset="0"/>
                                 </a:rPr>
                               </m:ctrlPr>
@@ -8702,14 +9349,14 @@
                               <m:f>
                                 <m:fPr>
                                   <m:ctrlPr>
-                                    <a:rPr lang="it-IT" b="0" i="1" smtClean="0">
+                                    <a:rPr lang="en-US" b="0" i="1" noProof="0" smtClean="0">
                                       <a:latin typeface="Cambria Math" panose="02040503050406030204" pitchFamily="18" charset="0"/>
                                     </a:rPr>
                                   </m:ctrlPr>
                                 </m:fPr>
                                 <m:num>
                                   <m:r>
-                                    <a:rPr lang="it-IT" b="0" i="1" smtClean="0">
+                                    <a:rPr lang="en-US" b="0" i="1" noProof="0" smtClean="0">
                                       <a:latin typeface="Cambria Math" panose="02040503050406030204" pitchFamily="18" charset="0"/>
                                     </a:rPr>
                                     <m:t>𝑇𝐵</m:t>
@@ -8717,7 +9364,7 @@
                                 </m:num>
                                 <m:den>
                                   <m:r>
-                                    <a:rPr lang="it-IT" b="0" i="1" smtClean="0">
+                                    <a:rPr lang="en-US" b="0" i="1" noProof="0" smtClean="0">
                                       <a:latin typeface="Cambria Math" panose="02040503050406030204" pitchFamily="18" charset="0"/>
                                     </a:rPr>
                                     <m:t>𝑠</m:t>
@@ -8729,55 +9376,55 @@
                         </m:den>
                       </m:f>
                       <m:r>
-                        <a:rPr lang="it-IT" b="0" i="1" smtClean="0">
+                        <a:rPr lang="en-US" b="0" i="1" noProof="0" smtClean="0">
                           <a:latin typeface="Cambria Math" panose="02040503050406030204" pitchFamily="18" charset="0"/>
                         </a:rPr>
                         <m:t>∗</m:t>
                       </m:r>
                       <m:r>
-                        <a:rPr lang="it-IT" b="0" i="1" smtClean="0">
+                        <a:rPr lang="en-US" b="0" i="1" noProof="0" smtClean="0">
                           <a:latin typeface="Cambria Math" panose="02040503050406030204" pitchFamily="18" charset="0"/>
                         </a:rPr>
                         <m:t>𝑠𝑦𝑧𝑒</m:t>
                       </m:r>
                       <m:r>
-                        <a:rPr lang="it-IT" b="0" i="1" smtClean="0">
+                        <a:rPr lang="en-US" b="0" i="1" noProof="0" smtClean="0">
                           <a:latin typeface="Cambria Math" panose="02040503050406030204" pitchFamily="18" charset="0"/>
                         </a:rPr>
                         <m:t> </m:t>
                       </m:r>
                       <m:r>
-                        <a:rPr lang="it-IT" b="0" i="1" smtClean="0">
+                        <a:rPr lang="en-US" b="0" i="1" noProof="0" smtClean="0">
                           <a:latin typeface="Cambria Math" panose="02040503050406030204" pitchFamily="18" charset="0"/>
                         </a:rPr>
                         <m:t>𝑜𝑓</m:t>
                       </m:r>
                       <m:r>
-                        <a:rPr lang="it-IT" b="0" i="1" smtClean="0">
+                        <a:rPr lang="en-US" b="0" i="1" noProof="0" smtClean="0">
                           <a:latin typeface="Cambria Math" panose="02040503050406030204" pitchFamily="18" charset="0"/>
                         </a:rPr>
                         <m:t> </m:t>
                       </m:r>
                       <m:r>
-                        <a:rPr lang="it-IT" b="0" i="1" smtClean="0">
+                        <a:rPr lang="en-US" b="0" i="1" noProof="0" smtClean="0">
                           <a:latin typeface="Cambria Math" panose="02040503050406030204" pitchFamily="18" charset="0"/>
                         </a:rPr>
                         <m:t>𝑎</m:t>
                       </m:r>
                       <m:r>
-                        <a:rPr lang="it-IT" b="0" i="1" smtClean="0">
+                        <a:rPr lang="en-US" b="0" i="1" noProof="0" smtClean="0">
                           <a:latin typeface="Cambria Math" panose="02040503050406030204" pitchFamily="18" charset="0"/>
                         </a:rPr>
                         <m:t> </m:t>
                       </m:r>
                       <m:r>
-                        <a:rPr lang="it-IT" b="0" i="1" smtClean="0">
+                        <a:rPr lang="en-US" b="0" i="1" noProof="0" smtClean="0">
                           <a:latin typeface="Cambria Math" panose="02040503050406030204" pitchFamily="18" charset="0"/>
                         </a:rPr>
                         <m:t>𝑛𝑢𝑚𝑏𝑒𝑟</m:t>
                       </m:r>
                       <m:r>
-                        <a:rPr lang="it-IT" b="0" i="1" smtClean="0">
+                        <a:rPr lang="en-US" b="0" i="1" noProof="0" smtClean="0">
                           <a:latin typeface="Cambria Math" panose="02040503050406030204" pitchFamily="18" charset="0"/>
                         </a:rPr>
                         <m:t> </m:t>
@@ -8787,14 +9434,14 @@
                           <m:begChr m:val="["/>
                           <m:endChr m:val="]"/>
                           <m:ctrlPr>
-                            <a:rPr lang="it-IT" b="0" i="1" smtClean="0">
+                            <a:rPr lang="en-US" b="0" i="1" noProof="0" smtClean="0">
                               <a:latin typeface="Cambria Math" panose="02040503050406030204" pitchFamily="18" charset="0"/>
                             </a:rPr>
                           </m:ctrlPr>
                         </m:dPr>
                         <m:e>
                           <m:r>
-                            <a:rPr lang="it-IT" b="0" i="1" smtClean="0">
+                            <a:rPr lang="en-US" b="0" i="1" noProof="0" smtClean="0">
                               <a:latin typeface="Cambria Math" panose="02040503050406030204" pitchFamily="18" charset="0"/>
                             </a:rPr>
                             <m:t>𝐵𝑖𝑡𝑒𝑠</m:t>
@@ -8804,14 +9451,14 @@
                     </m:oMath>
                   </m:oMathPara>
                 </a14:m>
-                <a:endParaRPr lang="en-US" dirty="0"/>
+                <a:endParaRPr lang="en-US" noProof="0" dirty="0"/>
               </a:p>
               <a:p>
-                <a:endParaRPr lang="en-US" dirty="0"/>
+                <a:endParaRPr lang="en-US" noProof="0" dirty="0"/>
               </a:p>
               <a:p>
                 <a:r>
-                  <a:rPr lang="en-US" dirty="0"/>
+                  <a:rPr lang="en-US" noProof="0" dirty="0"/>
                   <a:t>Then, depending on the precision we are working with:</a:t>
                 </a:r>
               </a:p>
@@ -8821,7 +9468,7 @@
                   <a:buChar char="•"/>
                 </a:pPr>
                 <a:r>
-                  <a:rPr lang="en-US" dirty="0"/>
+                  <a:rPr lang="en-US" noProof="0" dirty="0"/>
                   <a:t>Single precision: 87.0</a:t>
                 </a:r>
               </a:p>
@@ -8831,7 +9478,7 @@
                   <a:buChar char="•"/>
                 </a:pPr>
                 <a:r>
-                  <a:rPr lang="en-US" dirty="0"/>
+                  <a:rPr lang="en-US" noProof="0" dirty="0"/>
                   <a:t>Double precision: 8.4</a:t>
                 </a:r>
               </a:p>

</xml_diff>